<commit_message>
Final touches/clean up - Final commit
</commit_message>
<xml_diff>
--- a/ML_Project.pptx
+++ b/ML_Project.pptx
@@ -440,6 +440,35 @@
 </inkml:ink>
 </file>
 
+<file path=ppt/ink/ink19.xml><?xml version="1.0" encoding="utf-8"?>
+<inkml:ink xmlns:inkml="http://www.w3.org/2003/InkML">
+  <inkml:definitions>
+    <inkml:context xml:id="ctx0">
+      <inkml:inkSource xml:id="inkSrc0">
+        <inkml:traceFormat>
+          <inkml:channel name="X" type="integer" min="-2.14748E9" max="2.14748E9" units="cm"/>
+          <inkml:channel name="Y" type="integer" min="-2.14748E9" max="2.14748E9" units="cm"/>
+        </inkml:traceFormat>
+        <inkml:channelProperties>
+          <inkml:channelProperty channel="X" name="resolution" value="1000" units="1/cm"/>
+          <inkml:channelProperty channel="Y" name="resolution" value="1000" units="1/cm"/>
+        </inkml:channelProperties>
+      </inkml:inkSource>
+      <inkml:timestamp xml:id="ts0" timeString="2022-04-07T20:48:23.917"/>
+    </inkml:context>
+    <inkml:brush xml:id="br0">
+      <inkml:brushProperty name="width" value="0.3" units="cm"/>
+      <inkml:brushProperty name="height" value="0.6" units="cm"/>
+      <inkml:brushProperty name="color" value="#D9AEFF"/>
+      <inkml:brushProperty name="tip" value="rectangle"/>
+      <inkml:brushProperty name="rasterOp" value="maskPen"/>
+      <inkml:brushProperty name="ignorePressure" value="1"/>
+    </inkml:brush>
+  </inkml:definitions>
+  <inkml:trace contextRef="#ctx0" brushRef="#br0">0 1,'2185'0,"-2163"0</inkml:trace>
+</inkml:ink>
+</file>
+
 <file path=ppt/ink/ink2.xml><?xml version="1.0" encoding="utf-8"?>
 <inkml:ink xmlns:inkml="http://www.w3.org/2003/InkML">
   <inkml:definitions>
@@ -466,6 +495,151 @@
     </inkml:brush>
   </inkml:definitions>
   <inkml:trace contextRef="#ctx0" brushRef="#br0">1 1,'1396'0,"-1373"0</inkml:trace>
+</inkml:ink>
+</file>
+
+<file path=ppt/ink/ink20.xml><?xml version="1.0" encoding="utf-8"?>
+<inkml:ink xmlns:inkml="http://www.w3.org/2003/InkML">
+  <inkml:definitions>
+    <inkml:context xml:id="ctx0">
+      <inkml:inkSource xml:id="inkSrc0">
+        <inkml:traceFormat>
+          <inkml:channel name="X" type="integer" min="-2.14748E9" max="2.14748E9" units="cm"/>
+          <inkml:channel name="Y" type="integer" min="-2.14748E9" max="2.14748E9" units="cm"/>
+        </inkml:traceFormat>
+        <inkml:channelProperties>
+          <inkml:channelProperty channel="X" name="resolution" value="1000" units="1/cm"/>
+          <inkml:channelProperty channel="Y" name="resolution" value="1000" units="1/cm"/>
+        </inkml:channelProperties>
+      </inkml:inkSource>
+      <inkml:timestamp xml:id="ts0" timeString="2022-04-08T14:34:25.969"/>
+    </inkml:context>
+    <inkml:brush xml:id="br0">
+      <inkml:brushProperty name="width" value="0.3" units="cm"/>
+      <inkml:brushProperty name="height" value="0.6" units="cm"/>
+      <inkml:brushProperty name="color" value="#00B44B"/>
+      <inkml:brushProperty name="tip" value="rectangle"/>
+      <inkml:brushProperty name="rasterOp" value="maskPen"/>
+      <inkml:brushProperty name="ignorePressure" value="1"/>
+    </inkml:brush>
+  </inkml:definitions>
+  <inkml:trace contextRef="#ctx0" brushRef="#br0">0 0,'1323'0,"-1301"0</inkml:trace>
+</inkml:ink>
+</file>
+
+<file path=ppt/ink/ink21.xml><?xml version="1.0" encoding="utf-8"?>
+<inkml:ink xmlns:inkml="http://www.w3.org/2003/InkML">
+  <inkml:definitions>
+    <inkml:context xml:id="ctx0">
+      <inkml:inkSource xml:id="inkSrc0">
+        <inkml:traceFormat>
+          <inkml:channel name="X" type="integer" min="-2.14748E9" max="2.14748E9" units="cm"/>
+          <inkml:channel name="Y" type="integer" min="-2.14748E9" max="2.14748E9" units="cm"/>
+        </inkml:traceFormat>
+        <inkml:channelProperties>
+          <inkml:channelProperty channel="X" name="resolution" value="1000" units="1/cm"/>
+          <inkml:channelProperty channel="Y" name="resolution" value="1000" units="1/cm"/>
+        </inkml:channelProperties>
+      </inkml:inkSource>
+      <inkml:timestamp xml:id="ts0" timeString="2022-04-08T14:34:28.340"/>
+    </inkml:context>
+    <inkml:brush xml:id="br0">
+      <inkml:brushProperty name="width" value="0.3" units="cm"/>
+      <inkml:brushProperty name="height" value="0.6" units="cm"/>
+      <inkml:brushProperty name="color" value="#00B44B"/>
+      <inkml:brushProperty name="tip" value="rectangle"/>
+      <inkml:brushProperty name="rasterOp" value="maskPen"/>
+      <inkml:brushProperty name="ignorePressure" value="1"/>
+    </inkml:brush>
+  </inkml:definitions>
+  <inkml:trace contextRef="#ctx0" brushRef="#br0">1 10,'789'0,"-744"-4,-28-2</inkml:trace>
+</inkml:ink>
+</file>
+
+<file path=ppt/ink/ink22.xml><?xml version="1.0" encoding="utf-8"?>
+<inkml:ink xmlns:inkml="http://www.w3.org/2003/InkML">
+  <inkml:definitions>
+    <inkml:context xml:id="ctx0">
+      <inkml:inkSource xml:id="inkSrc0">
+        <inkml:traceFormat>
+          <inkml:channel name="X" type="integer" min="-2.14748E9" max="2.14748E9" units="cm"/>
+          <inkml:channel name="Y" type="integer" min="-2.14748E9" max="2.14748E9" units="cm"/>
+        </inkml:traceFormat>
+        <inkml:channelProperties>
+          <inkml:channelProperty channel="X" name="resolution" value="1000" units="1/cm"/>
+          <inkml:channelProperty channel="Y" name="resolution" value="1000" units="1/cm"/>
+        </inkml:channelProperties>
+      </inkml:inkSource>
+      <inkml:timestamp xml:id="ts0" timeString="2022-04-08T14:34:38.547"/>
+    </inkml:context>
+    <inkml:brush xml:id="br0">
+      <inkml:brushProperty name="width" value="0.3" units="cm"/>
+      <inkml:brushProperty name="height" value="0.6" units="cm"/>
+      <inkml:brushProperty name="color" value="#00B44B"/>
+      <inkml:brushProperty name="tip" value="rectangle"/>
+      <inkml:brushProperty name="rasterOp" value="maskPen"/>
+      <inkml:brushProperty name="ignorePressure" value="1"/>
+    </inkml:brush>
+  </inkml:definitions>
+  <inkml:trace contextRef="#ctx0" brushRef="#br0">1 1,'1347'0,"-1325"0</inkml:trace>
+</inkml:ink>
+</file>
+
+<file path=ppt/ink/ink23.xml><?xml version="1.0" encoding="utf-8"?>
+<inkml:ink xmlns:inkml="http://www.w3.org/2003/InkML">
+  <inkml:definitions>
+    <inkml:context xml:id="ctx0">
+      <inkml:inkSource xml:id="inkSrc0">
+        <inkml:traceFormat>
+          <inkml:channel name="X" type="integer" min="-2.14748E9" max="2.14748E9" units="cm"/>
+          <inkml:channel name="Y" type="integer" min="-2.14748E9" max="2.14748E9" units="cm"/>
+        </inkml:traceFormat>
+        <inkml:channelProperties>
+          <inkml:channelProperty channel="X" name="resolution" value="1000" units="1/cm"/>
+          <inkml:channelProperty channel="Y" name="resolution" value="1000" units="1/cm"/>
+        </inkml:channelProperties>
+      </inkml:inkSource>
+      <inkml:timestamp xml:id="ts0" timeString="2022-04-08T14:35:35.236"/>
+    </inkml:context>
+    <inkml:brush xml:id="br0">
+      <inkml:brushProperty name="width" value="0.3" units="cm"/>
+      <inkml:brushProperty name="height" value="0.6" units="cm"/>
+      <inkml:brushProperty name="color" value="#E6E6E6"/>
+      <inkml:brushProperty name="tip" value="rectangle"/>
+      <inkml:brushProperty name="rasterOp" value="maskPen"/>
+      <inkml:brushProperty name="ignorePressure" value="1"/>
+    </inkml:brush>
+  </inkml:definitions>
+  <inkml:trace contextRef="#ctx0" brushRef="#br0">30 103,'7'6,"-1"-1,1 1,0-2,1 1,-1-1,1 0,0 0,0-1,0 0,0-1,0 1,1-2,14 3,13-2,0-1,37-4,-8 0,16 3,-21 2,0-4,94-13,75-11,-120 3,111-17,-125 19,-202 18,-693 4,635-14,3-1,40 15,108-1</inkml:trace>
+</inkml:ink>
+</file>
+
+<file path=ppt/ink/ink24.xml><?xml version="1.0" encoding="utf-8"?>
+<inkml:ink xmlns:inkml="http://www.w3.org/2003/InkML">
+  <inkml:definitions>
+    <inkml:context xml:id="ctx0">
+      <inkml:inkSource xml:id="inkSrc0">
+        <inkml:traceFormat>
+          <inkml:channel name="X" type="integer" min="-2.14748E9" max="2.14748E9" units="cm"/>
+          <inkml:channel name="Y" type="integer" min="-2.14748E9" max="2.14748E9" units="cm"/>
+        </inkml:traceFormat>
+        <inkml:channelProperties>
+          <inkml:channelProperty channel="X" name="resolution" value="1000" units="1/cm"/>
+          <inkml:channelProperty channel="Y" name="resolution" value="1000" units="1/cm"/>
+        </inkml:channelProperties>
+      </inkml:inkSource>
+      <inkml:timestamp xml:id="ts0" timeString="2022-04-08T14:35:38.661"/>
+    </inkml:context>
+    <inkml:brush xml:id="br0">
+      <inkml:brushProperty name="width" value="0.3" units="cm"/>
+      <inkml:brushProperty name="height" value="0.6" units="cm"/>
+      <inkml:brushProperty name="color" value="#E6E6E6"/>
+      <inkml:brushProperty name="tip" value="rectangle"/>
+      <inkml:brushProperty name="rasterOp" value="maskPen"/>
+      <inkml:brushProperty name="ignorePressure" value="1"/>
+    </inkml:brush>
+  </inkml:definitions>
+  <inkml:trace contextRef="#ctx0" brushRef="#br0">152 0,'1048'0,"-2224"0,1153 0</inkml:trace>
 </inkml:ink>
 </file>
 
@@ -754,7 +928,7 @@
           <a:p>
             <a:fld id="{7487ADD9-2083-264C-A652-8D52D02F7E72}" type="datetimeFigureOut">
               <a:rPr lang="en-US" smtClean="0"/>
-              <a:t>4/7/2022</a:t>
+              <a:t>4/8/2022</a:t>
             </a:fld>
             <a:endParaRPr lang="en-US" dirty="0"/>
           </a:p>
@@ -2411,7 +2585,7 @@
             <a:fld id="{5F02DCD1-2C6B-F948-9F72-3BB0CF3D512E}" type="datetime1">
               <a:rPr lang="en-US" smtClean="0"/>
               <a:pPr/>
-              <a:t>4/7/2022</a:t>
+              <a:t>4/8/2022</a:t>
             </a:fld>
             <a:endParaRPr lang="en-US" dirty="0"/>
           </a:p>
@@ -3296,7 +3470,7 @@
             <a:fld id="{C1583C39-01BF-7F43-854C-FBB4E9AB6B0C}" type="datetime1">
               <a:rPr lang="en-US" smtClean="0"/>
               <a:pPr/>
-              <a:t>4/7/2022</a:t>
+              <a:t>4/8/2022</a:t>
             </a:fld>
             <a:endParaRPr lang="en-US" dirty="0"/>
           </a:p>
@@ -4473,7 +4647,7 @@
             <a:fld id="{4B103E64-1627-9140-8127-1849FED275E1}" type="datetime1">
               <a:rPr lang="en-US" smtClean="0"/>
               <a:pPr/>
-              <a:t>4/7/2022</a:t>
+              <a:t>4/8/2022</a:t>
             </a:fld>
             <a:endParaRPr lang="en-US" dirty="0"/>
           </a:p>
@@ -6553,7 +6727,7 @@
             <a:fld id="{DD9C8446-696E-6942-B6C8-CC9CAD0B34E0}" type="datetime1">
               <a:rPr lang="en-US" smtClean="0"/>
               <a:pPr/>
-              <a:t>4/7/2022</a:t>
+              <a:t>4/8/2022</a:t>
             </a:fld>
             <a:endParaRPr lang="en-US" dirty="0"/>
           </a:p>
@@ -7271,7 +7445,7 @@
             <a:fld id="{F5592931-05C6-8543-8B6E-A8BD29BD5C2B}" type="datetime1">
               <a:rPr lang="en-US" smtClean="0"/>
               <a:pPr/>
-              <a:t>4/7/2022</a:t>
+              <a:t>4/8/2022</a:t>
             </a:fld>
             <a:endParaRPr lang="en-US" dirty="0"/>
           </a:p>
@@ -8499,7 +8673,7 @@
             <a:fld id="{7E7AB22C-8B7E-9B4A-8C65-396C3C874D86}" type="datetime1">
               <a:rPr lang="en-US" smtClean="0"/>
               <a:pPr/>
-              <a:t>4/7/2022</a:t>
+              <a:t>4/8/2022</a:t>
             </a:fld>
             <a:endParaRPr lang="en-US" dirty="0"/>
           </a:p>
@@ -9091,7 +9265,7 @@
             <a:fld id="{8CE9AC2A-20AD-8C48-B5EB-B5322BDBCDEE}" type="datetime1">
               <a:rPr lang="en-US" smtClean="0"/>
               <a:pPr/>
-              <a:t>4/7/2022</a:t>
+              <a:t>4/8/2022</a:t>
             </a:fld>
             <a:endParaRPr lang="en-US" dirty="0"/>
           </a:p>
@@ -9564,7 +9738,7 @@
             <a:fld id="{4CF75428-5BE0-934D-BB71-675F8E23A386}" type="datetime1">
               <a:rPr lang="en-US" smtClean="0"/>
               <a:pPr/>
-              <a:t>4/7/2022</a:t>
+              <a:t>4/8/2022</a:t>
             </a:fld>
             <a:endParaRPr lang="en-US" dirty="0"/>
           </a:p>
@@ -10414,7 +10588,7 @@
             <a:fld id="{9A85C5CA-AE29-AB4C-8F85-0373C72001D8}" type="datetime1">
               <a:rPr lang="en-US" smtClean="0"/>
               <a:pPr/>
-              <a:t>4/7/2022</a:t>
+              <a:t>4/8/2022</a:t>
             </a:fld>
             <a:endParaRPr lang="en-US" dirty="0"/>
           </a:p>
@@ -12639,7 +12813,7 @@
             <a:fld id="{75594855-01E8-5A4B-B2B8-E2ECEF879100}" type="datetime1">
               <a:rPr lang="en-US" smtClean="0"/>
               <a:pPr/>
-              <a:t>4/7/2022</a:t>
+              <a:t>4/8/2022</a:t>
             </a:fld>
             <a:endParaRPr lang="en-US" dirty="0"/>
           </a:p>
@@ -12908,7 +13082,7 @@
             <a:fld id="{B562DF68-3089-814D-8A14-C651FE91885E}" type="datetime1">
               <a:rPr lang="en-US" smtClean="0"/>
               <a:pPr/>
-              <a:t>4/7/2022</a:t>
+              <a:t>4/8/2022</a:t>
             </a:fld>
             <a:endParaRPr lang="en-US" dirty="0"/>
           </a:p>
@@ -14356,7 +14530,7 @@
             </a:pPr>
             <a:r>
               <a:rPr lang="en-US" sz="1600" dirty="0"/>
-              <a:t>For all the above-mentioned models, numerical features were standardized, categorical variables were either label-encoded or </a:t>
+              <a:t>For all the above-mentioned models, numerical features were standardized, and the categorical variables were either label-encoded or </a:t>
             </a:r>
             <a:r>
               <a:rPr lang="en-US" sz="1600" dirty="0" err="1"/>
@@ -16080,7 +16254,7 @@
           <a:p>
             <a:r>
               <a:rPr lang="en-US" sz="3600" dirty="0"/>
-              <a:t>Support Vector Regression Model:</a:t>
+              <a:t>Support Vector Regression Model (SVR):</a:t>
             </a:r>
           </a:p>
         </p:txBody>
@@ -16117,7 +16291,7 @@
             </a:pPr>
             <a:r>
               <a:rPr lang="en-US" sz="1800" dirty="0"/>
-              <a:t>Final PLR Models used log-transformed dependent and independent variables.</a:t>
+              <a:t>Final SVR Model used log-transformed dependent and independent variables.</a:t>
             </a:r>
           </a:p>
           <a:p>
@@ -16127,7 +16301,7 @@
             </a:pPr>
             <a:r>
               <a:rPr lang="en-US" sz="1800" dirty="0"/>
-              <a:t>Models were trained/evaluated on a 70:30 train-test split. Some features with high VIF values were removed.</a:t>
+              <a:t>Model was trained/evaluated on a 70:30 train-test split. Some features with high VIF values were removed.</a:t>
             </a:r>
           </a:p>
           <a:p>
@@ -17831,14 +18005,14 @@
           <p:nvPr>
             <p:extLst>
               <p:ext uri="{D42A27DB-BD31-4B8C-83A1-F6EECF244321}">
-                <p14:modId xmlns:p14="http://schemas.microsoft.com/office/powerpoint/2010/main" val="4017113704"/>
+                <p14:modId xmlns:p14="http://schemas.microsoft.com/office/powerpoint/2010/main" val="2381772573"/>
               </p:ext>
             </p:extLst>
           </p:nvPr>
         </p:nvGraphicFramePr>
         <p:xfrm>
-          <a:off x="594605" y="2718152"/>
-          <a:ext cx="4682474" cy="3182144"/>
+          <a:off x="603749" y="2951422"/>
+          <a:ext cx="4682474" cy="2727552"/>
         </p:xfrm>
         <a:graphic>
           <a:graphicData uri="http://schemas.openxmlformats.org/drawingml/2006/table">
@@ -17930,41 +18104,6 @@
                 <a:extLst>
                   <a:ext uri="{0D108BD9-81ED-4DB2-BD59-A6C34878D82A}">
                     <a16:rowId xmlns:a16="http://schemas.microsoft.com/office/drawing/2014/main" val="142042218"/>
-                  </a:ext>
-                </a:extLst>
-              </a:tr>
-              <a:tr h="454592">
-                <a:tc>
-                  <a:txBody>
-                    <a:bodyPr/>
-                    <a:lstStyle/>
-                    <a:p>
-                      <a:pPr algn="ctr"/>
-                      <a:r>
-                        <a:rPr lang="en-US" sz="1600" dirty="0"/>
-                        <a:t>eta</a:t>
-                      </a:r>
-                    </a:p>
-                  </a:txBody>
-                  <a:tcPr/>
-                </a:tc>
-                <a:tc>
-                  <a:txBody>
-                    <a:bodyPr/>
-                    <a:lstStyle/>
-                    <a:p>
-                      <a:pPr algn="ctr"/>
-                      <a:r>
-                        <a:rPr lang="en-US" sz="1600" dirty="0"/>
-                        <a:t>0.1</a:t>
-                      </a:r>
-                    </a:p>
-                  </a:txBody>
-                  <a:tcPr/>
-                </a:tc>
-                <a:extLst>
-                  <a:ext uri="{0D108BD9-81ED-4DB2-BD59-A6C34878D82A}">
-                    <a16:rowId xmlns:a16="http://schemas.microsoft.com/office/drawing/2014/main" val="2800426012"/>
                   </a:ext>
                 </a:extLst>
               </a:tr>
@@ -18521,14 +18660,14 @@
           <p:nvPr>
             <p:extLst>
               <p:ext uri="{D42A27DB-BD31-4B8C-83A1-F6EECF244321}">
-                <p14:modId xmlns:p14="http://schemas.microsoft.com/office/powerpoint/2010/main" val="3282553831"/>
+                <p14:modId xmlns:p14="http://schemas.microsoft.com/office/powerpoint/2010/main" val="3238025087"/>
               </p:ext>
             </p:extLst>
           </p:nvPr>
         </p:nvGraphicFramePr>
         <p:xfrm>
           <a:off x="381000" y="1568252"/>
-          <a:ext cx="9038421" cy="3114468"/>
+          <a:ext cx="9038424" cy="2985570"/>
         </p:xfrm>
         <a:graphic>
           <a:graphicData uri="http://schemas.openxmlformats.org/drawingml/2006/table">
@@ -18537,49 +18676,56 @@
                 <a:tableStyleId>{5C22544A-7EE6-4342-B048-85BDC9FD1C3A}</a:tableStyleId>
               </a:tblPr>
               <a:tblGrid>
-                <a:gridCol w="1291203">
+                <a:gridCol w="1129803">
                   <a:extLst>
                     <a:ext uri="{9D8B030D-6E8A-4147-A177-3AD203B41FA5}">
                       <a16:colId xmlns:a16="http://schemas.microsoft.com/office/drawing/2014/main" val="1022086791"/>
                     </a:ext>
                   </a:extLst>
                 </a:gridCol>
-                <a:gridCol w="1291203">
+                <a:gridCol w="1129803">
                   <a:extLst>
                     <a:ext uri="{9D8B030D-6E8A-4147-A177-3AD203B41FA5}">
                       <a16:colId xmlns:a16="http://schemas.microsoft.com/office/drawing/2014/main" val="1141245761"/>
                     </a:ext>
                   </a:extLst>
                 </a:gridCol>
-                <a:gridCol w="1291203">
+                <a:gridCol w="1129803">
                   <a:extLst>
                     <a:ext uri="{9D8B030D-6E8A-4147-A177-3AD203B41FA5}">
                       <a16:colId xmlns:a16="http://schemas.microsoft.com/office/drawing/2014/main" val="2224841127"/>
                     </a:ext>
                   </a:extLst>
                 </a:gridCol>
-                <a:gridCol w="1291203">
+                <a:gridCol w="1129803">
                   <a:extLst>
                     <a:ext uri="{9D8B030D-6E8A-4147-A177-3AD203B41FA5}">
                       <a16:colId xmlns:a16="http://schemas.microsoft.com/office/drawing/2014/main" val="3944898148"/>
                     </a:ext>
                   </a:extLst>
                 </a:gridCol>
-                <a:gridCol w="1291203">
+                <a:gridCol w="1129803">
+                  <a:extLst>
+                    <a:ext uri="{9D8B030D-6E8A-4147-A177-3AD203B41FA5}">
+                      <a16:colId xmlns:a16="http://schemas.microsoft.com/office/drawing/2014/main" val="2551897193"/>
+                    </a:ext>
+                  </a:extLst>
+                </a:gridCol>
+                <a:gridCol w="1129803">
                   <a:extLst>
                     <a:ext uri="{9D8B030D-6E8A-4147-A177-3AD203B41FA5}">
                       <a16:colId xmlns:a16="http://schemas.microsoft.com/office/drawing/2014/main" val="1262408487"/>
                     </a:ext>
                   </a:extLst>
                 </a:gridCol>
-                <a:gridCol w="1291203">
+                <a:gridCol w="1129803">
                   <a:extLst>
                     <a:ext uri="{9D8B030D-6E8A-4147-A177-3AD203B41FA5}">
                       <a16:colId xmlns:a16="http://schemas.microsoft.com/office/drawing/2014/main" val="765415619"/>
                     </a:ext>
                   </a:extLst>
                 </a:gridCol>
-                <a:gridCol w="1291203">
+                <a:gridCol w="1129803">
                   <a:extLst>
                     <a:ext uri="{9D8B030D-6E8A-4147-A177-3AD203B41FA5}">
                       <a16:colId xmlns:a16="http://schemas.microsoft.com/office/drawing/2014/main" val="16360909"/>
@@ -18594,7 +18740,7 @@
                     <a:lstStyle/>
                     <a:p>
                       <a:pPr algn="ctr"/>
-                      <a:endParaRPr lang="en-US" dirty="0"/>
+                      <a:endParaRPr lang="en-US" sz="1600" dirty="0"/>
                     </a:p>
                   </a:txBody>
                   <a:tcPr anchor="ctr"/>
@@ -18606,7 +18752,7 @@
                     <a:p>
                       <a:pPr algn="ctr"/>
                       <a:r>
-                        <a:rPr lang="en-US" dirty="0"/>
+                        <a:rPr lang="en-US" sz="1600" dirty="0"/>
                         <a:t>MLR</a:t>
                       </a:r>
                     </a:p>
@@ -18620,7 +18766,7 @@
                     <a:p>
                       <a:pPr algn="ctr"/>
                       <a:r>
-                        <a:rPr lang="en-US" dirty="0"/>
+                        <a:rPr lang="en-US" sz="1600" dirty="0"/>
                         <a:t>Ridge</a:t>
                       </a:r>
                     </a:p>
@@ -18634,7 +18780,7 @@
                     <a:p>
                       <a:pPr algn="ctr"/>
                       <a:r>
-                        <a:rPr lang="en-US" dirty="0"/>
+                        <a:rPr lang="en-US" sz="1600" dirty="0"/>
                         <a:t>Lasso</a:t>
                       </a:r>
                     </a:p>
@@ -18648,7 +18794,21 @@
                     <a:p>
                       <a:pPr algn="ctr"/>
                       <a:r>
-                        <a:rPr lang="en-US" dirty="0"/>
+                        <a:rPr lang="en-US" sz="1600" dirty="0"/>
+                        <a:t>SVR</a:t>
+                      </a:r>
+                    </a:p>
+                  </a:txBody>
+                  <a:tcPr anchor="ctr"/>
+                </a:tc>
+                <a:tc>
+                  <a:txBody>
+                    <a:bodyPr/>
+                    <a:lstStyle/>
+                    <a:p>
+                      <a:pPr algn="ctr"/>
+                      <a:r>
+                        <a:rPr lang="en-US" sz="1600" dirty="0"/>
                         <a:t>Random Forest</a:t>
                       </a:r>
                     </a:p>
@@ -18662,14 +18822,14 @@
                     <a:p>
                       <a:pPr algn="ctr"/>
                       <a:r>
-                        <a:rPr lang="en-US" dirty="0" err="1">
+                        <a:rPr lang="en-US" sz="1600" dirty="0" err="1">
                           <a:solidFill>
                             <a:srgbClr val="C00000"/>
                           </a:solidFill>
                         </a:rPr>
                         <a:t>XGBoost</a:t>
                       </a:r>
-                      <a:endParaRPr lang="en-US" dirty="0">
+                      <a:endParaRPr lang="en-US" sz="1600" dirty="0">
                         <a:solidFill>
                           <a:srgbClr val="C00000"/>
                         </a:solidFill>
@@ -18685,7 +18845,7 @@
                     <a:p>
                       <a:pPr algn="ctr"/>
                       <a:r>
-                        <a:rPr lang="en-US" dirty="0" err="1">
+                        <a:rPr lang="en-US" sz="1600" dirty="0" err="1">
                           <a:solidFill>
                             <a:srgbClr val="C00000"/>
                           </a:solidFill>
@@ -18693,7 +18853,7 @@
                         <a:t>XGBoost</a:t>
                       </a:r>
                       <a:r>
-                        <a:rPr lang="en-US" dirty="0">
+                        <a:rPr lang="en-US" sz="1600" dirty="0">
                           <a:solidFill>
                             <a:srgbClr val="C00000"/>
                           </a:solidFill>
@@ -18718,11 +18878,11 @@
                     <a:p>
                       <a:pPr algn="ctr"/>
                       <a:r>
-                        <a:rPr lang="en-US" dirty="0"/>
+                        <a:rPr lang="en-US" sz="1600" dirty="0"/>
                         <a:t>Train R</a:t>
                       </a:r>
                       <a:r>
-                        <a:rPr lang="en-US" baseline="30000" dirty="0"/>
+                        <a:rPr lang="en-US" sz="1600" baseline="30000" dirty="0"/>
                         <a:t>2</a:t>
                       </a:r>
                     </a:p>
@@ -18736,7 +18896,7 @@
                     <a:p>
                       <a:pPr algn="ctr"/>
                       <a:r>
-                        <a:rPr lang="en-US" dirty="0"/>
+                        <a:rPr lang="en-US" sz="1600" dirty="0"/>
                         <a:t>0.890</a:t>
                       </a:r>
                     </a:p>
@@ -18750,7 +18910,7 @@
                     <a:p>
                       <a:pPr algn="ctr"/>
                       <a:r>
-                        <a:rPr lang="en-US" dirty="0"/>
+                        <a:rPr lang="en-US" sz="1600" dirty="0"/>
                         <a:t>0.936</a:t>
                       </a:r>
                     </a:p>
@@ -18764,7 +18924,7 @@
                     <a:p>
                       <a:pPr algn="ctr"/>
                       <a:r>
-                        <a:rPr lang="en-US" dirty="0"/>
+                        <a:rPr lang="en-US" sz="1600" dirty="0"/>
                         <a:t>0.920</a:t>
                       </a:r>
                     </a:p>
@@ -18778,7 +18938,21 @@
                     <a:p>
                       <a:pPr algn="ctr"/>
                       <a:r>
-                        <a:rPr lang="en-US" dirty="0"/>
+                        <a:rPr lang="en-US" sz="1600" dirty="0"/>
+                        <a:t>0.939</a:t>
+                      </a:r>
+                    </a:p>
+                  </a:txBody>
+                  <a:tcPr anchor="ctr"/>
+                </a:tc>
+                <a:tc>
+                  <a:txBody>
+                    <a:bodyPr/>
+                    <a:lstStyle/>
+                    <a:p>
+                      <a:pPr algn="ctr"/>
+                      <a:r>
+                        <a:rPr lang="en-US" sz="1600" dirty="0"/>
                         <a:t>0.975</a:t>
                       </a:r>
                     </a:p>
@@ -18792,7 +18966,7 @@
                     <a:p>
                       <a:pPr algn="ctr"/>
                       <a:r>
-                        <a:rPr lang="en-US" dirty="0">
+                        <a:rPr lang="en-US" sz="1600" dirty="0">
                           <a:solidFill>
                             <a:srgbClr val="C00000"/>
                           </a:solidFill>
@@ -18810,7 +18984,7 @@
                     <a:p>
                       <a:pPr algn="ctr"/>
                       <a:r>
-                        <a:rPr lang="en-US" dirty="0">
+                        <a:rPr lang="en-US" sz="1600" dirty="0">
                           <a:solidFill>
                             <a:srgbClr val="C00000"/>
                           </a:solidFill>
@@ -18835,11 +19009,11 @@
                     <a:p>
                       <a:pPr algn="ctr"/>
                       <a:r>
-                        <a:rPr lang="en-US" dirty="0"/>
+                        <a:rPr lang="en-US" sz="1600" dirty="0"/>
                         <a:t>Test R</a:t>
                       </a:r>
                       <a:r>
-                        <a:rPr lang="en-US" baseline="30000" dirty="0"/>
+                        <a:rPr lang="en-US" sz="1600" baseline="30000" dirty="0"/>
                         <a:t>2</a:t>
                       </a:r>
                     </a:p>
@@ -18853,7 +19027,7 @@
                     <a:p>
                       <a:pPr algn="ctr"/>
                       <a:r>
-                        <a:rPr lang="en-US" dirty="0"/>
+                        <a:rPr lang="en-US" sz="1600" dirty="0"/>
                         <a:t>0.876</a:t>
                       </a:r>
                     </a:p>
@@ -18867,7 +19041,7 @@
                     <a:p>
                       <a:pPr algn="ctr"/>
                       <a:r>
-                        <a:rPr lang="en-US" dirty="0"/>
+                        <a:rPr lang="en-US" sz="1600" dirty="0"/>
                         <a:t>0.906</a:t>
                       </a:r>
                     </a:p>
@@ -18881,7 +19055,7 @@
                     <a:p>
                       <a:pPr algn="ctr"/>
                       <a:r>
-                        <a:rPr lang="en-US" dirty="0"/>
+                        <a:rPr lang="en-US" sz="1600" dirty="0"/>
                         <a:t>0.900</a:t>
                       </a:r>
                     </a:p>
@@ -18895,7 +19069,21 @@
                     <a:p>
                       <a:pPr algn="ctr"/>
                       <a:r>
-                        <a:rPr lang="en-US" dirty="0"/>
+                        <a:rPr lang="en-US" sz="1600" dirty="0"/>
+                        <a:t>0.914</a:t>
+                      </a:r>
+                    </a:p>
+                  </a:txBody>
+                  <a:tcPr anchor="ctr"/>
+                </a:tc>
+                <a:tc>
+                  <a:txBody>
+                    <a:bodyPr/>
+                    <a:lstStyle/>
+                    <a:p>
+                      <a:pPr algn="ctr"/>
+                      <a:r>
+                        <a:rPr lang="en-US" sz="1600" dirty="0"/>
                         <a:t>0.893</a:t>
                       </a:r>
                     </a:p>
@@ -18909,7 +19097,7 @@
                     <a:p>
                       <a:pPr algn="ctr"/>
                       <a:r>
-                        <a:rPr lang="en-US" dirty="0">
+                        <a:rPr lang="en-US" sz="1600" dirty="0">
                           <a:solidFill>
                             <a:srgbClr val="C00000"/>
                           </a:solidFill>
@@ -18927,7 +19115,7 @@
                     <a:p>
                       <a:pPr algn="ctr"/>
                       <a:r>
-                        <a:rPr lang="en-US" dirty="0">
+                        <a:rPr lang="en-US" sz="1600" dirty="0">
                           <a:solidFill>
                             <a:srgbClr val="C00000"/>
                           </a:solidFill>
@@ -18952,7 +19140,7 @@
                     <a:p>
                       <a:pPr algn="ctr"/>
                       <a:r>
-                        <a:rPr lang="en-US" dirty="0"/>
+                        <a:rPr lang="en-US" sz="1600" dirty="0"/>
                         <a:t>Train RMSE</a:t>
                       </a:r>
                     </a:p>
@@ -18966,7 +19154,7 @@
                     <a:p>
                       <a:pPr algn="ctr"/>
                       <a:r>
-                        <a:rPr lang="en-US" dirty="0"/>
+                        <a:rPr lang="en-US" sz="1600" dirty="0"/>
                         <a:t>0.133</a:t>
                       </a:r>
                     </a:p>
@@ -18980,7 +19168,7 @@
                     <a:p>
                       <a:pPr algn="ctr"/>
                       <a:r>
-                        <a:rPr lang="en-US" dirty="0"/>
+                        <a:rPr lang="en-US" sz="1600" dirty="0"/>
                         <a:t>0.101</a:t>
                       </a:r>
                     </a:p>
@@ -18994,7 +19182,7 @@
                     <a:p>
                       <a:pPr algn="ctr"/>
                       <a:r>
-                        <a:rPr lang="en-US" dirty="0"/>
+                        <a:rPr lang="en-US" sz="1600" dirty="0"/>
                         <a:t>0.113</a:t>
                       </a:r>
                     </a:p>
@@ -19008,7 +19196,21 @@
                     <a:p>
                       <a:pPr algn="ctr"/>
                       <a:r>
-                        <a:rPr lang="en-US" dirty="0"/>
+                        <a:rPr lang="en-US" sz="1600" dirty="0"/>
+                        <a:t>0.099</a:t>
+                      </a:r>
+                    </a:p>
+                  </a:txBody>
+                  <a:tcPr anchor="ctr"/>
+                </a:tc>
+                <a:tc>
+                  <a:txBody>
+                    <a:bodyPr/>
+                    <a:lstStyle/>
+                    <a:p>
+                      <a:pPr algn="ctr"/>
+                      <a:r>
+                        <a:rPr lang="en-US" sz="1600" dirty="0"/>
                         <a:t>0.063</a:t>
                       </a:r>
                     </a:p>
@@ -19022,7 +19224,7 @@
                     <a:p>
                       <a:pPr algn="ctr"/>
                       <a:r>
-                        <a:rPr lang="en-US" dirty="0">
+                        <a:rPr lang="en-US" sz="1600" dirty="0">
                           <a:solidFill>
                             <a:srgbClr val="C00000"/>
                           </a:solidFill>
@@ -19040,7 +19242,7 @@
                     <a:p>
                       <a:pPr algn="ctr"/>
                       <a:r>
-                        <a:rPr lang="en-US" dirty="0">
+                        <a:rPr lang="en-US" sz="1600" dirty="0">
                           <a:solidFill>
                             <a:srgbClr val="C00000"/>
                           </a:solidFill>
@@ -19081,13 +19283,13 @@
                         <a:defRPr/>
                       </a:pPr>
                       <a:r>
-                        <a:rPr lang="en-US" dirty="0"/>
+                        <a:rPr lang="en-US" sz="1600" dirty="0"/>
                         <a:t>Test RMSE</a:t>
                       </a:r>
                     </a:p>
                     <a:p>
                       <a:pPr algn="ctr"/>
-                      <a:endParaRPr lang="en-US" dirty="0"/>
+                      <a:endParaRPr lang="en-US" sz="1600" dirty="0"/>
                     </a:p>
                   </a:txBody>
                   <a:tcPr anchor="ctr"/>
@@ -19099,7 +19301,7 @@
                     <a:p>
                       <a:pPr algn="ctr"/>
                       <a:r>
-                        <a:rPr lang="en-US" dirty="0"/>
+                        <a:rPr lang="en-US" sz="1600" dirty="0"/>
                         <a:t>0.137</a:t>
                       </a:r>
                     </a:p>
@@ -19113,7 +19315,7 @@
                     <a:p>
                       <a:pPr algn="ctr"/>
                       <a:r>
-                        <a:rPr lang="en-US" dirty="0"/>
+                        <a:rPr lang="en-US" sz="1600" dirty="0"/>
                         <a:t>0.119</a:t>
                       </a:r>
                     </a:p>
@@ -19127,7 +19329,7 @@
                     <a:p>
                       <a:pPr algn="ctr"/>
                       <a:r>
-                        <a:rPr lang="en-US" dirty="0"/>
+                        <a:rPr lang="en-US" sz="1600" dirty="0"/>
                         <a:t>0.123</a:t>
                       </a:r>
                     </a:p>
@@ -19141,7 +19343,21 @@
                     <a:p>
                       <a:pPr algn="ctr"/>
                       <a:r>
-                        <a:rPr lang="en-US" dirty="0"/>
+                        <a:rPr lang="en-US" sz="1600" dirty="0"/>
+                        <a:t>0.114</a:t>
+                      </a:r>
+                    </a:p>
+                  </a:txBody>
+                  <a:tcPr anchor="ctr"/>
+                </a:tc>
+                <a:tc>
+                  <a:txBody>
+                    <a:bodyPr/>
+                    <a:lstStyle/>
+                    <a:p>
+                      <a:pPr algn="ctr"/>
+                      <a:r>
+                        <a:rPr lang="en-US" sz="1600" dirty="0"/>
                         <a:t>0.127</a:t>
                       </a:r>
                     </a:p>
@@ -19155,7 +19371,7 @@
                     <a:p>
                       <a:pPr algn="ctr"/>
                       <a:r>
-                        <a:rPr lang="en-US" dirty="0">
+                        <a:rPr lang="en-US" sz="1600" dirty="0">
                           <a:solidFill>
                             <a:srgbClr val="C00000"/>
                           </a:solidFill>
@@ -19173,7 +19389,7 @@
                     <a:p>
                       <a:pPr algn="ctr"/>
                       <a:r>
-                        <a:rPr lang="en-US" dirty="0">
+                        <a:rPr lang="en-US" sz="1600" dirty="0">
                           <a:solidFill>
                             <a:srgbClr val="C00000"/>
                           </a:solidFill>
@@ -19555,7 +19771,7 @@
             <a:fld id="{8CE9AC2A-20AD-8C48-B5EB-B5322BDBCDEE}" type="datetime1">
               <a:rPr lang="en-US" smtClean="0"/>
               <a:pPr/>
-              <a:t>4/7/2022</a:t>
+              <a:t>4/8/2022</a:t>
             </a:fld>
             <a:endParaRPr lang="en-US" dirty="0"/>
           </a:p>
@@ -19783,8 +19999,8 @@
           </a:prstGeom>
         </p:spPr>
       </p:pic>
-      <mc:AlternateContent xmlns:mc="http://schemas.openxmlformats.org/markup-compatibility/2006">
-        <mc:Choice xmlns:p14="http://schemas.microsoft.com/office/powerpoint/2010/main" Requires="p14">
+      <mc:AlternateContent xmlns:mc="http://schemas.openxmlformats.org/markup-compatibility/2006" xmlns:p14="http://schemas.microsoft.com/office/powerpoint/2010/main">
+        <mc:Choice Requires="p14">
           <p:contentPart p14:bwMode="auto" r:id="rId6">
             <p14:nvContentPartPr>
               <p14:cNvPr id="14" name="Ink 13">
@@ -19803,7 +20019,7 @@
             </p14:xfrm>
           </p:contentPart>
         </mc:Choice>
-        <mc:Fallback>
+        <mc:Fallback xmlns="">
           <p:pic>
             <p:nvPicPr>
               <p:cNvPr id="14" name="Ink 13">
@@ -19834,8 +20050,8 @@
           </p:pic>
         </mc:Fallback>
       </mc:AlternateContent>
-      <mc:AlternateContent xmlns:mc="http://schemas.openxmlformats.org/markup-compatibility/2006">
-        <mc:Choice xmlns:p14="http://schemas.microsoft.com/office/powerpoint/2010/main" Requires="p14">
+      <mc:AlternateContent xmlns:mc="http://schemas.openxmlformats.org/markup-compatibility/2006" xmlns:p14="http://schemas.microsoft.com/office/powerpoint/2010/main">
+        <mc:Choice Requires="p14">
           <p:contentPart p14:bwMode="auto" r:id="rId8">
             <p14:nvContentPartPr>
               <p14:cNvPr id="15" name="Ink 14">
@@ -19854,7 +20070,7 @@
             </p14:xfrm>
           </p:contentPart>
         </mc:Choice>
-        <mc:Fallback>
+        <mc:Fallback xmlns="">
           <p:pic>
             <p:nvPicPr>
               <p:cNvPr id="15" name="Ink 14">
@@ -19885,8 +20101,8 @@
           </p:pic>
         </mc:Fallback>
       </mc:AlternateContent>
-      <mc:AlternateContent xmlns:mc="http://schemas.openxmlformats.org/markup-compatibility/2006">
-        <mc:Choice xmlns:p14="http://schemas.microsoft.com/office/powerpoint/2010/main" Requires="p14">
+      <mc:AlternateContent xmlns:mc="http://schemas.openxmlformats.org/markup-compatibility/2006" xmlns:p14="http://schemas.microsoft.com/office/powerpoint/2010/main">
+        <mc:Choice Requires="p14">
           <p:contentPart p14:bwMode="auto" r:id="rId10">
             <p14:nvContentPartPr>
               <p14:cNvPr id="16" name="Ink 15">
@@ -19905,7 +20121,7 @@
             </p14:xfrm>
           </p:contentPart>
         </mc:Choice>
-        <mc:Fallback>
+        <mc:Fallback xmlns="">
           <p:pic>
             <p:nvPicPr>
               <p:cNvPr id="16" name="Ink 15">
@@ -19936,8 +20152,8 @@
           </p:pic>
         </mc:Fallback>
       </mc:AlternateContent>
-      <mc:AlternateContent xmlns:mc="http://schemas.openxmlformats.org/markup-compatibility/2006">
-        <mc:Choice xmlns:p14="http://schemas.microsoft.com/office/powerpoint/2010/main" Requires="p14">
+      <mc:AlternateContent xmlns:mc="http://schemas.openxmlformats.org/markup-compatibility/2006" xmlns:p14="http://schemas.microsoft.com/office/powerpoint/2010/main">
+        <mc:Choice Requires="p14">
           <p:contentPart p14:bwMode="auto" r:id="rId12">
             <p14:nvContentPartPr>
               <p14:cNvPr id="17" name="Ink 16">
@@ -19956,7 +20172,7 @@
             </p14:xfrm>
           </p:contentPart>
         </mc:Choice>
-        <mc:Fallback>
+        <mc:Fallback xmlns="">
           <p:pic>
             <p:nvPicPr>
               <p:cNvPr id="17" name="Ink 16">
@@ -19987,8 +20203,8 @@
           </p:pic>
         </mc:Fallback>
       </mc:AlternateContent>
-      <mc:AlternateContent xmlns:mc="http://schemas.openxmlformats.org/markup-compatibility/2006">
-        <mc:Choice xmlns:p14="http://schemas.microsoft.com/office/powerpoint/2010/main" Requires="p14">
+      <mc:AlternateContent xmlns:mc="http://schemas.openxmlformats.org/markup-compatibility/2006" xmlns:p14="http://schemas.microsoft.com/office/powerpoint/2010/main">
+        <mc:Choice Requires="p14">
           <p:contentPart p14:bwMode="auto" r:id="rId14">
             <p14:nvContentPartPr>
               <p14:cNvPr id="18" name="Ink 17">
@@ -20007,7 +20223,7 @@
             </p14:xfrm>
           </p:contentPart>
         </mc:Choice>
-        <mc:Fallback>
+        <mc:Fallback xmlns="">
           <p:pic>
             <p:nvPicPr>
               <p:cNvPr id="18" name="Ink 17">
@@ -20038,8 +20254,8 @@
           </p:pic>
         </mc:Fallback>
       </mc:AlternateContent>
-      <mc:AlternateContent xmlns:mc="http://schemas.openxmlformats.org/markup-compatibility/2006">
-        <mc:Choice xmlns:p14="http://schemas.microsoft.com/office/powerpoint/2010/main" Requires="p14">
+      <mc:AlternateContent xmlns:mc="http://schemas.openxmlformats.org/markup-compatibility/2006" xmlns:p14="http://schemas.microsoft.com/office/powerpoint/2010/main">
+        <mc:Choice Requires="p14">
           <p:contentPart p14:bwMode="auto" r:id="rId16">
             <p14:nvContentPartPr>
               <p14:cNvPr id="19" name="Ink 18">
@@ -20058,7 +20274,7 @@
             </p14:xfrm>
           </p:contentPart>
         </mc:Choice>
-        <mc:Fallback>
+        <mc:Fallback xmlns="">
           <p:pic>
             <p:nvPicPr>
               <p:cNvPr id="19" name="Ink 18">
@@ -20089,8 +20305,8 @@
           </p:pic>
         </mc:Fallback>
       </mc:AlternateContent>
-      <mc:AlternateContent xmlns:mc="http://schemas.openxmlformats.org/markup-compatibility/2006">
-        <mc:Choice xmlns:p14="http://schemas.microsoft.com/office/powerpoint/2010/main" Requires="p14">
+      <mc:AlternateContent xmlns:mc="http://schemas.openxmlformats.org/markup-compatibility/2006" xmlns:p14="http://schemas.microsoft.com/office/powerpoint/2010/main">
+        <mc:Choice Requires="p14">
           <p:contentPart p14:bwMode="auto" r:id="rId18">
             <p14:nvContentPartPr>
               <p14:cNvPr id="20" name="Ink 19">
@@ -20109,7 +20325,7 @@
             </p14:xfrm>
           </p:contentPart>
         </mc:Choice>
-        <mc:Fallback>
+        <mc:Fallback xmlns="">
           <p:pic>
             <p:nvPicPr>
               <p:cNvPr id="20" name="Ink 19">
@@ -20140,8 +20356,8 @@
           </p:pic>
         </mc:Fallback>
       </mc:AlternateContent>
-      <mc:AlternateContent xmlns:mc="http://schemas.openxmlformats.org/markup-compatibility/2006">
-        <mc:Choice xmlns:p14="http://schemas.microsoft.com/office/powerpoint/2010/main" Requires="p14">
+      <mc:AlternateContent xmlns:mc="http://schemas.openxmlformats.org/markup-compatibility/2006" xmlns:p14="http://schemas.microsoft.com/office/powerpoint/2010/main">
+        <mc:Choice Requires="p14">
           <p:contentPart p14:bwMode="auto" r:id="rId20">
             <p14:nvContentPartPr>
               <p14:cNvPr id="21" name="Ink 20">
@@ -20160,7 +20376,7 @@
             </p14:xfrm>
           </p:contentPart>
         </mc:Choice>
-        <mc:Fallback>
+        <mc:Fallback xmlns="">
           <p:pic>
             <p:nvPicPr>
               <p:cNvPr id="21" name="Ink 20">
@@ -20191,8 +20407,8 @@
           </p:pic>
         </mc:Fallback>
       </mc:AlternateContent>
-      <mc:AlternateContent xmlns:mc="http://schemas.openxmlformats.org/markup-compatibility/2006">
-        <mc:Choice xmlns:p14="http://schemas.microsoft.com/office/powerpoint/2010/main" Requires="p14">
+      <mc:AlternateContent xmlns:mc="http://schemas.openxmlformats.org/markup-compatibility/2006" xmlns:p14="http://schemas.microsoft.com/office/powerpoint/2010/main">
+        <mc:Choice Requires="p14">
           <p:contentPart p14:bwMode="auto" r:id="rId22">
             <p14:nvContentPartPr>
               <p14:cNvPr id="22" name="Ink 21">
@@ -20211,7 +20427,7 @@
             </p14:xfrm>
           </p:contentPart>
         </mc:Choice>
-        <mc:Fallback>
+        <mc:Fallback xmlns="">
           <p:pic>
             <p:nvPicPr>
               <p:cNvPr id="22" name="Ink 21">
@@ -20242,8 +20458,8 @@
           </p:pic>
         </mc:Fallback>
       </mc:AlternateContent>
-      <mc:AlternateContent xmlns:mc="http://schemas.openxmlformats.org/markup-compatibility/2006">
-        <mc:Choice xmlns:p14="http://schemas.microsoft.com/office/powerpoint/2010/main" Requires="p14">
+      <mc:AlternateContent xmlns:mc="http://schemas.openxmlformats.org/markup-compatibility/2006" xmlns:p14="http://schemas.microsoft.com/office/powerpoint/2010/main">
+        <mc:Choice Requires="p14">
           <p:contentPart p14:bwMode="auto" r:id="rId24">
             <p14:nvContentPartPr>
               <p14:cNvPr id="23" name="Ink 22">
@@ -20262,7 +20478,7 @@
             </p14:xfrm>
           </p:contentPart>
         </mc:Choice>
-        <mc:Fallback>
+        <mc:Fallback xmlns="">
           <p:pic>
             <p:nvPicPr>
               <p:cNvPr id="23" name="Ink 22">
@@ -20293,8 +20509,8 @@
           </p:pic>
         </mc:Fallback>
       </mc:AlternateContent>
-      <mc:AlternateContent xmlns:mc="http://schemas.openxmlformats.org/markup-compatibility/2006">
-        <mc:Choice xmlns:p14="http://schemas.microsoft.com/office/powerpoint/2010/main" Requires="p14">
+      <mc:AlternateContent xmlns:mc="http://schemas.openxmlformats.org/markup-compatibility/2006" xmlns:p14="http://schemas.microsoft.com/office/powerpoint/2010/main">
+        <mc:Choice Requires="p14">
           <p:contentPart p14:bwMode="auto" r:id="rId26">
             <p14:nvContentPartPr>
               <p14:cNvPr id="24" name="Ink 23">
@@ -20313,7 +20529,7 @@
             </p14:xfrm>
           </p:contentPart>
         </mc:Choice>
-        <mc:Fallback>
+        <mc:Fallback xmlns="">
           <p:pic>
             <p:nvPicPr>
               <p:cNvPr id="24" name="Ink 23">
@@ -20344,8 +20560,8 @@
           </p:pic>
         </mc:Fallback>
       </mc:AlternateContent>
-      <mc:AlternateContent xmlns:mc="http://schemas.openxmlformats.org/markup-compatibility/2006">
-        <mc:Choice xmlns:p14="http://schemas.microsoft.com/office/powerpoint/2010/main" Requires="p14">
+      <mc:AlternateContent xmlns:mc="http://schemas.openxmlformats.org/markup-compatibility/2006" xmlns:p14="http://schemas.microsoft.com/office/powerpoint/2010/main">
+        <mc:Choice Requires="p14">
           <p:contentPart p14:bwMode="auto" r:id="rId28">
             <p14:nvContentPartPr>
               <p14:cNvPr id="25" name="Ink 24">
@@ -20364,7 +20580,7 @@
             </p14:xfrm>
           </p:contentPart>
         </mc:Choice>
-        <mc:Fallback>
+        <mc:Fallback xmlns="">
           <p:pic>
             <p:nvPicPr>
               <p:cNvPr id="25" name="Ink 24">
@@ -20395,8 +20611,8 @@
           </p:pic>
         </mc:Fallback>
       </mc:AlternateContent>
-      <mc:AlternateContent xmlns:mc="http://schemas.openxmlformats.org/markup-compatibility/2006">
-        <mc:Choice xmlns:p14="http://schemas.microsoft.com/office/powerpoint/2010/main" Requires="p14">
+      <mc:AlternateContent xmlns:mc="http://schemas.openxmlformats.org/markup-compatibility/2006" xmlns:p14="http://schemas.microsoft.com/office/powerpoint/2010/main">
+        <mc:Choice Requires="p14">
           <p:contentPart p14:bwMode="auto" r:id="rId30">
             <p14:nvContentPartPr>
               <p14:cNvPr id="26" name="Ink 25">
@@ -20415,7 +20631,7 @@
             </p14:xfrm>
           </p:contentPart>
         </mc:Choice>
-        <mc:Fallback>
+        <mc:Fallback xmlns="">
           <p:pic>
             <p:nvPicPr>
               <p:cNvPr id="26" name="Ink 25">
@@ -20446,8 +20662,8 @@
           </p:pic>
         </mc:Fallback>
       </mc:AlternateContent>
-      <mc:AlternateContent xmlns:mc="http://schemas.openxmlformats.org/markup-compatibility/2006">
-        <mc:Choice xmlns:p14="http://schemas.microsoft.com/office/powerpoint/2010/main" Requires="p14">
+      <mc:AlternateContent xmlns:mc="http://schemas.openxmlformats.org/markup-compatibility/2006" xmlns:p14="http://schemas.microsoft.com/office/powerpoint/2010/main">
+        <mc:Choice Requires="p14">
           <p:contentPart p14:bwMode="auto" r:id="rId32">
             <p14:nvContentPartPr>
               <p14:cNvPr id="27" name="Ink 26">
@@ -20466,7 +20682,7 @@
             </p14:xfrm>
           </p:contentPart>
         </mc:Choice>
-        <mc:Fallback>
+        <mc:Fallback xmlns="">
           <p:pic>
             <p:nvPicPr>
               <p:cNvPr id="27" name="Ink 26">
@@ -20497,8 +20713,8 @@
           </p:pic>
         </mc:Fallback>
       </mc:AlternateContent>
-      <mc:AlternateContent xmlns:mc="http://schemas.openxmlformats.org/markup-compatibility/2006">
-        <mc:Choice xmlns:p14="http://schemas.microsoft.com/office/powerpoint/2010/main" Requires="p14">
+      <mc:AlternateContent xmlns:mc="http://schemas.openxmlformats.org/markup-compatibility/2006" xmlns:p14="http://schemas.microsoft.com/office/powerpoint/2010/main">
+        <mc:Choice Requires="p14">
           <p:contentPart p14:bwMode="auto" r:id="rId34">
             <p14:nvContentPartPr>
               <p14:cNvPr id="28" name="Ink 27">
@@ -20517,7 +20733,7 @@
             </p14:xfrm>
           </p:contentPart>
         </mc:Choice>
-        <mc:Fallback>
+        <mc:Fallback xmlns="">
           <p:pic>
             <p:nvPicPr>
               <p:cNvPr id="28" name="Ink 27">
@@ -20548,8 +20764,8 @@
           </p:pic>
         </mc:Fallback>
       </mc:AlternateContent>
-      <mc:AlternateContent xmlns:mc="http://schemas.openxmlformats.org/markup-compatibility/2006">
-        <mc:Choice xmlns:p14="http://schemas.microsoft.com/office/powerpoint/2010/main" Requires="p14">
+      <mc:AlternateContent xmlns:mc="http://schemas.openxmlformats.org/markup-compatibility/2006" xmlns:p14="http://schemas.microsoft.com/office/powerpoint/2010/main">
+        <mc:Choice Requires="p14">
           <p:contentPart p14:bwMode="auto" r:id="rId36">
             <p14:nvContentPartPr>
               <p14:cNvPr id="29" name="Ink 28">
@@ -20568,7 +20784,7 @@
             </p14:xfrm>
           </p:contentPart>
         </mc:Choice>
-        <mc:Fallback>
+        <mc:Fallback xmlns="">
           <p:pic>
             <p:nvPicPr>
               <p:cNvPr id="29" name="Ink 28">
@@ -20599,8 +20815,8 @@
           </p:pic>
         </mc:Fallback>
       </mc:AlternateContent>
-      <mc:AlternateContent xmlns:mc="http://schemas.openxmlformats.org/markup-compatibility/2006">
-        <mc:Choice xmlns:p14="http://schemas.microsoft.com/office/powerpoint/2010/main" Requires="p14">
+      <mc:AlternateContent xmlns:mc="http://schemas.openxmlformats.org/markup-compatibility/2006" xmlns:p14="http://schemas.microsoft.com/office/powerpoint/2010/main">
+        <mc:Choice Requires="p14">
           <p:contentPart p14:bwMode="auto" r:id="rId38">
             <p14:nvContentPartPr>
               <p14:cNvPr id="30" name="Ink 29">
@@ -20619,7 +20835,7 @@
             </p14:xfrm>
           </p:contentPart>
         </mc:Choice>
-        <mc:Fallback>
+        <mc:Fallback xmlns="">
           <p:pic>
             <p:nvPicPr>
               <p:cNvPr id="30" name="Ink 29">
@@ -20650,8 +20866,8 @@
           </p:pic>
         </mc:Fallback>
       </mc:AlternateContent>
-      <mc:AlternateContent xmlns:mc="http://schemas.openxmlformats.org/markup-compatibility/2006">
-        <mc:Choice xmlns:p14="http://schemas.microsoft.com/office/powerpoint/2010/main" Requires="p14">
+      <mc:AlternateContent xmlns:mc="http://schemas.openxmlformats.org/markup-compatibility/2006" xmlns:p14="http://schemas.microsoft.com/office/powerpoint/2010/main">
+        <mc:Choice Requires="p14">
           <p:contentPart p14:bwMode="auto" r:id="rId40">
             <p14:nvContentPartPr>
               <p14:cNvPr id="31" name="Ink 30">
@@ -20670,7 +20886,7 @@
             </p14:xfrm>
           </p:contentPart>
         </mc:Choice>
-        <mc:Fallback>
+        <mc:Fallback xmlns="">
           <p:pic>
             <p:nvPicPr>
               <p:cNvPr id="31" name="Ink 30">
@@ -20693,6 +20909,312 @@
               <a:xfrm>
                 <a:off x="2250432" y="3330072"/>
                 <a:ext cx="555120" cy="216000"/>
+              </a:xfrm>
+              <a:prstGeom prst="rect">
+                <a:avLst/>
+              </a:prstGeom>
+            </p:spPr>
+          </p:pic>
+        </mc:Fallback>
+      </mc:AlternateContent>
+      <mc:AlternateContent xmlns:mc="http://schemas.openxmlformats.org/markup-compatibility/2006" xmlns:p14="http://schemas.microsoft.com/office/powerpoint/2010/main">
+        <mc:Choice Requires="p14">
+          <p:contentPart p14:bwMode="auto" r:id="rId42">
+            <p14:nvContentPartPr>
+              <p14:cNvPr id="33" name="Ink 32">
+                <a:extLst>
+                  <a:ext uri="{FF2B5EF4-FFF2-40B4-BE49-F238E27FC236}">
+                    <a16:creationId xmlns:a16="http://schemas.microsoft.com/office/drawing/2014/main" id="{A78B15F5-F8BF-4681-8E6D-367CF51DEBF0}"/>
+                  </a:ext>
+                </a:extLst>
+              </p14:cNvPr>
+              <p14:cNvContentPartPr/>
+              <p14:nvPr/>
+            </p14:nvContentPartPr>
+            <p14:xfrm>
+              <a:off x="9701712" y="3081312"/>
+              <a:ext cx="794880" cy="360"/>
+            </p14:xfrm>
+          </p:contentPart>
+        </mc:Choice>
+        <mc:Fallback xmlns="">
+          <p:pic>
+            <p:nvPicPr>
+              <p:cNvPr id="33" name="Ink 32">
+                <a:extLst>
+                  <a:ext uri="{FF2B5EF4-FFF2-40B4-BE49-F238E27FC236}">
+                    <a16:creationId xmlns:a16="http://schemas.microsoft.com/office/drawing/2014/main" id="{A78B15F5-F8BF-4681-8E6D-367CF51DEBF0}"/>
+                  </a:ext>
+                </a:extLst>
+              </p:cNvPr>
+              <p:cNvPicPr/>
+              <p:nvPr/>
+            </p:nvPicPr>
+            <p:blipFill>
+              <a:blip r:embed="rId43"/>
+              <a:stretch>
+                <a:fillRect/>
+              </a:stretch>
+            </p:blipFill>
+            <p:spPr>
+              <a:xfrm>
+                <a:off x="9647712" y="2973672"/>
+                <a:ext cx="902520" cy="216000"/>
+              </a:xfrm>
+              <a:prstGeom prst="rect">
+                <a:avLst/>
+              </a:prstGeom>
+            </p:spPr>
+          </p:pic>
+        </mc:Fallback>
+      </mc:AlternateContent>
+      <mc:AlternateContent xmlns:mc="http://schemas.openxmlformats.org/markup-compatibility/2006">
+        <mc:Choice xmlns:p14="http://schemas.microsoft.com/office/powerpoint/2010/main" Requires="p14">
+          <p:contentPart p14:bwMode="auto" r:id="rId44">
+            <p14:nvContentPartPr>
+              <p14:cNvPr id="3" name="Ink 2">
+                <a:extLst>
+                  <a:ext uri="{FF2B5EF4-FFF2-40B4-BE49-F238E27FC236}">
+                    <a16:creationId xmlns:a16="http://schemas.microsoft.com/office/drawing/2014/main" id="{0DD5B1FE-CB9C-4814-8A3D-72B880453E0C}"/>
+                  </a:ext>
+                </a:extLst>
+              </p14:cNvPr>
+              <p14:cNvContentPartPr/>
+              <p14:nvPr/>
+            </p14:nvContentPartPr>
+            <p14:xfrm>
+              <a:off x="1289232" y="1590912"/>
+              <a:ext cx="484560" cy="360"/>
+            </p14:xfrm>
+          </p:contentPart>
+        </mc:Choice>
+        <mc:Fallback>
+          <p:pic>
+            <p:nvPicPr>
+              <p:cNvPr id="3" name="Ink 2">
+                <a:extLst>
+                  <a:ext uri="{FF2B5EF4-FFF2-40B4-BE49-F238E27FC236}">
+                    <a16:creationId xmlns:a16="http://schemas.microsoft.com/office/drawing/2014/main" id="{0DD5B1FE-CB9C-4814-8A3D-72B880453E0C}"/>
+                  </a:ext>
+                </a:extLst>
+              </p:cNvPr>
+              <p:cNvPicPr/>
+              <p:nvPr/>
+            </p:nvPicPr>
+            <p:blipFill>
+              <a:blip r:embed="rId45"/>
+              <a:stretch>
+                <a:fillRect/>
+              </a:stretch>
+            </p:blipFill>
+            <p:spPr>
+              <a:xfrm>
+                <a:off x="1235232" y="1482912"/>
+                <a:ext cx="592200" cy="216000"/>
+              </a:xfrm>
+              <a:prstGeom prst="rect">
+                <a:avLst/>
+              </a:prstGeom>
+            </p:spPr>
+          </p:pic>
+        </mc:Fallback>
+      </mc:AlternateContent>
+      <mc:AlternateContent xmlns:mc="http://schemas.openxmlformats.org/markup-compatibility/2006">
+        <mc:Choice xmlns:p14="http://schemas.microsoft.com/office/powerpoint/2010/main" Requires="p14">
+          <p:contentPart p14:bwMode="auto" r:id="rId46">
+            <p14:nvContentPartPr>
+              <p14:cNvPr id="12" name="Ink 11">
+                <a:extLst>
+                  <a:ext uri="{FF2B5EF4-FFF2-40B4-BE49-F238E27FC236}">
+                    <a16:creationId xmlns:a16="http://schemas.microsoft.com/office/drawing/2014/main" id="{FC546FB7-82B8-480B-BE4B-41B5CE0808A3}"/>
+                  </a:ext>
+                </a:extLst>
+              </p14:cNvPr>
+              <p14:cNvContentPartPr/>
+              <p14:nvPr/>
+            </p14:nvContentPartPr>
+            <p14:xfrm>
+              <a:off x="2450232" y="2529072"/>
+              <a:ext cx="306720" cy="3960"/>
+            </p14:xfrm>
+          </p:contentPart>
+        </mc:Choice>
+        <mc:Fallback>
+          <p:pic>
+            <p:nvPicPr>
+              <p:cNvPr id="12" name="Ink 11">
+                <a:extLst>
+                  <a:ext uri="{FF2B5EF4-FFF2-40B4-BE49-F238E27FC236}">
+                    <a16:creationId xmlns:a16="http://schemas.microsoft.com/office/drawing/2014/main" id="{FC546FB7-82B8-480B-BE4B-41B5CE0808A3}"/>
+                  </a:ext>
+                </a:extLst>
+              </p:cNvPr>
+              <p:cNvPicPr/>
+              <p:nvPr/>
+            </p:nvPicPr>
+            <p:blipFill>
+              <a:blip r:embed="rId47"/>
+              <a:stretch>
+                <a:fillRect/>
+              </a:stretch>
+            </p:blipFill>
+            <p:spPr>
+              <a:xfrm>
+                <a:off x="2396592" y="2421072"/>
+                <a:ext cx="414360" cy="219600"/>
+              </a:xfrm>
+              <a:prstGeom prst="rect">
+                <a:avLst/>
+              </a:prstGeom>
+            </p:spPr>
+          </p:pic>
+        </mc:Fallback>
+      </mc:AlternateContent>
+      <mc:AlternateContent xmlns:mc="http://schemas.openxmlformats.org/markup-compatibility/2006">
+        <mc:Choice xmlns:p14="http://schemas.microsoft.com/office/powerpoint/2010/main" Requires="p14">
+          <p:contentPart p14:bwMode="auto" r:id="rId48">
+            <p14:nvContentPartPr>
+              <p14:cNvPr id="32" name="Ink 31">
+                <a:extLst>
+                  <a:ext uri="{FF2B5EF4-FFF2-40B4-BE49-F238E27FC236}">
+                    <a16:creationId xmlns:a16="http://schemas.microsoft.com/office/drawing/2014/main" id="{377FAB9F-F5DE-4642-867A-8FCAD9C54147}"/>
+                  </a:ext>
+                </a:extLst>
+              </p14:cNvPr>
+              <p14:cNvContentPartPr/>
+              <p14:nvPr/>
+            </p14:nvContentPartPr>
+            <p14:xfrm>
+              <a:off x="9985032" y="4635792"/>
+              <a:ext cx="493200" cy="360"/>
+            </p14:xfrm>
+          </p:contentPart>
+        </mc:Choice>
+        <mc:Fallback>
+          <p:pic>
+            <p:nvPicPr>
+              <p:cNvPr id="32" name="Ink 31">
+                <a:extLst>
+                  <a:ext uri="{FF2B5EF4-FFF2-40B4-BE49-F238E27FC236}">
+                    <a16:creationId xmlns:a16="http://schemas.microsoft.com/office/drawing/2014/main" id="{377FAB9F-F5DE-4642-867A-8FCAD9C54147}"/>
+                  </a:ext>
+                </a:extLst>
+              </p:cNvPr>
+              <p:cNvPicPr/>
+              <p:nvPr/>
+            </p:nvPicPr>
+            <p:blipFill>
+              <a:blip r:embed="rId49"/>
+              <a:stretch>
+                <a:fillRect/>
+              </a:stretch>
+            </p:blipFill>
+            <p:spPr>
+              <a:xfrm>
+                <a:off x="9931392" y="4528152"/>
+                <a:ext cx="600840" cy="216000"/>
+              </a:xfrm>
+              <a:prstGeom prst="rect">
+                <a:avLst/>
+              </a:prstGeom>
+            </p:spPr>
+          </p:pic>
+        </mc:Fallback>
+      </mc:AlternateContent>
+      <mc:AlternateContent xmlns:mc="http://schemas.openxmlformats.org/markup-compatibility/2006">
+        <mc:Choice xmlns:p14="http://schemas.microsoft.com/office/powerpoint/2010/main" Requires="p14">
+          <p:contentPart p14:bwMode="auto" r:id="rId50">
+            <p14:nvContentPartPr>
+              <p14:cNvPr id="37" name="Ink 36">
+                <a:extLst>
+                  <a:ext uri="{FF2B5EF4-FFF2-40B4-BE49-F238E27FC236}">
+                    <a16:creationId xmlns:a16="http://schemas.microsoft.com/office/drawing/2014/main" id="{B868A2A1-E5C7-4B71-B7F8-92A7B6976891}"/>
+                  </a:ext>
+                </a:extLst>
+              </p14:cNvPr>
+              <p14:cNvContentPartPr/>
+              <p14:nvPr/>
+            </p14:nvContentPartPr>
+            <p14:xfrm>
+              <a:off x="1232712" y="3611232"/>
+              <a:ext cx="493200" cy="57960"/>
+            </p14:xfrm>
+          </p:contentPart>
+        </mc:Choice>
+        <mc:Fallback>
+          <p:pic>
+            <p:nvPicPr>
+              <p:cNvPr id="37" name="Ink 36">
+                <a:extLst>
+                  <a:ext uri="{FF2B5EF4-FFF2-40B4-BE49-F238E27FC236}">
+                    <a16:creationId xmlns:a16="http://schemas.microsoft.com/office/drawing/2014/main" id="{B868A2A1-E5C7-4B71-B7F8-92A7B6976891}"/>
+                  </a:ext>
+                </a:extLst>
+              </p:cNvPr>
+              <p:cNvPicPr/>
+              <p:nvPr/>
+            </p:nvPicPr>
+            <p:blipFill>
+              <a:blip r:embed="rId51"/>
+              <a:stretch>
+                <a:fillRect/>
+              </a:stretch>
+            </p:blipFill>
+            <p:spPr>
+              <a:xfrm>
+                <a:off x="1178712" y="3503232"/>
+                <a:ext cx="600840" cy="273600"/>
+              </a:xfrm>
+              <a:prstGeom prst="rect">
+                <a:avLst/>
+              </a:prstGeom>
+            </p:spPr>
+          </p:pic>
+        </mc:Fallback>
+      </mc:AlternateContent>
+      <mc:AlternateContent xmlns:mc="http://schemas.openxmlformats.org/markup-compatibility/2006">
+        <mc:Choice xmlns:p14="http://schemas.microsoft.com/office/powerpoint/2010/main" Requires="p14">
+          <p:contentPart p14:bwMode="auto" r:id="rId52">
+            <p14:nvContentPartPr>
+              <p14:cNvPr id="38" name="Ink 37">
+                <a:extLst>
+                  <a:ext uri="{FF2B5EF4-FFF2-40B4-BE49-F238E27FC236}">
+                    <a16:creationId xmlns:a16="http://schemas.microsoft.com/office/drawing/2014/main" id="{503054E4-ACB9-45B4-8B5C-3E5E79BC304C}"/>
+                  </a:ext>
+                </a:extLst>
+              </p14:cNvPr>
+              <p14:cNvContentPartPr/>
+              <p14:nvPr/>
+            </p14:nvContentPartPr>
+            <p14:xfrm>
+              <a:off x="2322792" y="4105512"/>
+              <a:ext cx="432000" cy="360"/>
+            </p14:xfrm>
+          </p:contentPart>
+        </mc:Choice>
+        <mc:Fallback>
+          <p:pic>
+            <p:nvPicPr>
+              <p:cNvPr id="38" name="Ink 37">
+                <a:extLst>
+                  <a:ext uri="{FF2B5EF4-FFF2-40B4-BE49-F238E27FC236}">
+                    <a16:creationId xmlns:a16="http://schemas.microsoft.com/office/drawing/2014/main" id="{503054E4-ACB9-45B4-8B5C-3E5E79BC304C}"/>
+                  </a:ext>
+                </a:extLst>
+              </p:cNvPr>
+              <p:cNvPicPr/>
+              <p:nvPr/>
+            </p:nvPicPr>
+            <p:blipFill>
+              <a:blip r:embed="rId53"/>
+              <a:stretch>
+                <a:fillRect/>
+              </a:stretch>
+            </p:blipFill>
+            <p:spPr>
+              <a:xfrm>
+                <a:off x="2269152" y="3997512"/>
+                <a:ext cx="539640" cy="216000"/>
               </a:xfrm>
               <a:prstGeom prst="rect">
                 <a:avLst/>
@@ -23341,15 +23863,6 @@
 </file>
 
 <file path=customXml/item1.xml><?xml version="1.0" encoding="utf-8"?>
-<?mso-contentType ?>
-<FormTemplates xmlns="http://schemas.microsoft.com/sharepoint/v3/contenttype/forms">
-  <Display>DocumentLibraryForm</Display>
-  <Edit>DocumentLibraryForm</Edit>
-  <New>DocumentLibraryForm</New>
-</FormTemplates>
-</file>
-
-<file path=customXml/item2.xml><?xml version="1.0" encoding="utf-8"?>
 <p:properties xmlns:p="http://schemas.microsoft.com/office/2006/metadata/properties" xmlns:xsi="http://www.w3.org/2001/XMLSchema-instance" xmlns:pc="http://schemas.microsoft.com/office/infopath/2007/PartnerControls">
   <documentManagement>
     <_ip_UnifiedCompliancePolicyUIAction xmlns="http://schemas.microsoft.com/sharepoint/v3" xsi:nil="true"/>
@@ -23366,6 +23879,15 @@
     <MediaServiceKeyPoints xmlns="71af3243-3dd4-4a8d-8c0d-dd76da1f02a5" xsi:nil="true"/>
   </documentManagement>
 </p:properties>
+</file>
+
+<file path=customXml/item2.xml><?xml version="1.0" encoding="utf-8"?>
+<?mso-contentType ?>
+<FormTemplates xmlns="http://schemas.microsoft.com/sharepoint/v3/contenttype/forms">
+  <Display>DocumentLibraryForm</Display>
+  <Edit>DocumentLibraryForm</Edit>
+  <New>DocumentLibraryForm</New>
+</FormTemplates>
 </file>
 
 <file path=customXml/item3.xml><?xml version="1.0" encoding="utf-8"?>
@@ -23651,14 +24173,6 @@
 </file>
 
 <file path=customXml/itemProps1.xml><?xml version="1.0" encoding="utf-8"?>
-<ds:datastoreItem xmlns:ds="http://schemas.openxmlformats.org/officeDocument/2006/customXml" ds:itemID="{85334180-0405-413B-834A-44FA9E05ADB7}">
-  <ds:schemaRefs>
-    <ds:schemaRef ds:uri="http://schemas.microsoft.com/sharepoint/v3/contenttype/forms"/>
-  </ds:schemaRefs>
-</ds:datastoreItem>
-</file>
-
-<file path=customXml/itemProps2.xml><?xml version="1.0" encoding="utf-8"?>
 <ds:datastoreItem xmlns:ds="http://schemas.openxmlformats.org/officeDocument/2006/customXml" ds:itemID="{4D5BAB77-79E1-4739-AA51-10C9079186D6}">
   <ds:schemaRefs>
     <ds:schemaRef ds:uri="http://schemas.microsoft.com/office/2006/metadata/properties"/>
@@ -23666,6 +24180,14 @@
     <ds:schemaRef ds:uri="http://schemas.microsoft.com/sharepoint/v3"/>
     <ds:schemaRef ds:uri="71af3243-3dd4-4a8d-8c0d-dd76da1f02a5"/>
     <ds:schemaRef ds:uri="230e9df3-be65-4c73-a93b-d1236ebd677e"/>
+  </ds:schemaRefs>
+</ds:datastoreItem>
+</file>
+
+<file path=customXml/itemProps2.xml><?xml version="1.0" encoding="utf-8"?>
+<ds:datastoreItem xmlns:ds="http://schemas.openxmlformats.org/officeDocument/2006/customXml" ds:itemID="{85334180-0405-413B-834A-44FA9E05ADB7}">
+  <ds:schemaRefs>
+    <ds:schemaRef ds:uri="http://schemas.microsoft.com/sharepoint/v3/contenttype/forms"/>
   </ds:schemaRefs>
 </ds:datastoreItem>
 </file>

</xml_diff>

<commit_message>
Some edits made - Final commit
</commit_message>
<xml_diff>
--- a/ML_Project.pptx
+++ b/ML_Project.pptx
@@ -164,7 +164,36 @@
           <inkml:channelProperty channel="Y" name="resolution" value="1000" units="1/cm"/>
         </inkml:channelProperties>
       </inkml:inkSource>
-      <inkml:timestamp xml:id="ts0" timeString="2022-04-07T20:41:08.190"/>
+      <inkml:timestamp xml:id="ts0" timeString="2022-04-08T15:12:43.674"/>
+    </inkml:context>
+    <inkml:brush xml:id="br0">
+      <inkml:brushProperty name="width" value="0.3" units="cm"/>
+      <inkml:brushProperty name="height" value="0.6" units="cm"/>
+      <inkml:brushProperty name="color" value="#E6E6E6"/>
+      <inkml:brushProperty name="tip" value="rectangle"/>
+      <inkml:brushProperty name="rasterOp" value="maskPen"/>
+      <inkml:brushProperty name="ignorePressure" value="1"/>
+    </inkml:brush>
+  </inkml:definitions>
+  <inkml:trace contextRef="#ctx0" brushRef="#br0">1 0,'0'0</inkml:trace>
+</inkml:ink>
+</file>
+
+<file path=ppt/ink/ink10.xml><?xml version="1.0" encoding="utf-8"?>
+<inkml:ink xmlns:inkml="http://www.w3.org/2003/InkML">
+  <inkml:definitions>
+    <inkml:context xml:id="ctx0">
+      <inkml:inkSource xml:id="inkSrc0">
+        <inkml:traceFormat>
+          <inkml:channel name="X" type="integer" min="-2.14748E9" max="2.14748E9" units="cm"/>
+          <inkml:channel name="Y" type="integer" min="-2.14748E9" max="2.14748E9" units="cm"/>
+        </inkml:traceFormat>
+        <inkml:channelProperties>
+          <inkml:channelProperty channel="X" name="resolution" value="1000" units="1/cm"/>
+          <inkml:channelProperty channel="Y" name="resolution" value="1000" units="1/cm"/>
+        </inkml:channelProperties>
+      </inkml:inkSource>
+      <inkml:timestamp xml:id="ts0" timeString="2022-04-07T20:41:11.241"/>
     </inkml:context>
     <inkml:brush xml:id="br0">
       <inkml:brushProperty name="width" value="0.3" units="cm"/>
@@ -175,11 +204,214 @@
       <inkml:brushProperty name="ignorePressure" value="1"/>
     </inkml:brush>
   </inkml:definitions>
-  <inkml:trace contextRef="#ctx0" brushRef="#br0">1 53,'1606'0,"-1584"-1,0-2,-1 0,1-2,29-9,-28 7,-1 1,1 1,46-3,7 8,-54 0</inkml:trace>
+  <inkml:trace contextRef="#ctx0" brushRef="#br0">1 1,'1396'0,"-1373"0</inkml:trace>
 </inkml:ink>
 </file>
 
-<file path=ppt/ink/ink10.xml><?xml version="1.0" encoding="utf-8"?>
+<file path=ppt/ink/ink11.xml><?xml version="1.0" encoding="utf-8"?>
+<inkml:ink xmlns:inkml="http://www.w3.org/2003/InkML">
+  <inkml:definitions>
+    <inkml:context xml:id="ctx0">
+      <inkml:inkSource xml:id="inkSrc0">
+        <inkml:traceFormat>
+          <inkml:channel name="X" type="integer" min="-2.14748E9" max="2.14748E9" units="cm"/>
+          <inkml:channel name="Y" type="integer" min="-2.14748E9" max="2.14748E9" units="cm"/>
+        </inkml:traceFormat>
+        <inkml:channelProperties>
+          <inkml:channelProperty channel="X" name="resolution" value="1000" units="1/cm"/>
+          <inkml:channelProperty channel="Y" name="resolution" value="1000" units="1/cm"/>
+        </inkml:channelProperties>
+      </inkml:inkSource>
+      <inkml:timestamp xml:id="ts0" timeString="2022-04-07T20:41:14.341"/>
+    </inkml:context>
+    <inkml:brush xml:id="br0">
+      <inkml:brushProperty name="width" value="0.3" units="cm"/>
+      <inkml:brushProperty name="height" value="0.6" units="cm"/>
+      <inkml:brushProperty name="color" value="#FFFC00"/>
+      <inkml:brushProperty name="tip" value="rectangle"/>
+      <inkml:brushProperty name="rasterOp" value="maskPen"/>
+      <inkml:brushProperty name="ignorePressure" value="1"/>
+    </inkml:brush>
+  </inkml:definitions>
+  <inkml:trace contextRef="#ctx0" brushRef="#br0">0 0,'109'5,"0"5,129 28,-238-38,89 13,128 3,92-18,-99-1,426 3,-609 0</inkml:trace>
+</inkml:ink>
+</file>
+
+<file path=ppt/ink/ink12.xml><?xml version="1.0" encoding="utf-8"?>
+<inkml:ink xmlns:inkml="http://www.w3.org/2003/InkML">
+  <inkml:definitions>
+    <inkml:context xml:id="ctx0">
+      <inkml:inkSource xml:id="inkSrc0">
+        <inkml:traceFormat>
+          <inkml:channel name="X" type="integer" min="-2.14748E9" max="2.14748E9" units="cm"/>
+          <inkml:channel name="Y" type="integer" min="-2.14748E9" max="2.14748E9" units="cm"/>
+        </inkml:traceFormat>
+        <inkml:channelProperties>
+          <inkml:channelProperty channel="X" name="resolution" value="1000" units="1/cm"/>
+          <inkml:channelProperty channel="Y" name="resolution" value="1000" units="1/cm"/>
+        </inkml:channelProperties>
+      </inkml:inkSource>
+      <inkml:timestamp xml:id="ts0" timeString="2022-04-07T20:41:17.138"/>
+    </inkml:context>
+    <inkml:brush xml:id="br0">
+      <inkml:brushProperty name="width" value="0.3" units="cm"/>
+      <inkml:brushProperty name="height" value="0.6" units="cm"/>
+      <inkml:brushProperty name="color" value="#FFFC00"/>
+      <inkml:brushProperty name="tip" value="rectangle"/>
+      <inkml:brushProperty name="rasterOp" value="maskPen"/>
+      <inkml:brushProperty name="ignorePressure" value="1"/>
+    </inkml:brush>
+  </inkml:definitions>
+  <inkml:trace contextRef="#ctx0" brushRef="#br0">1 0,'224'12,"-45"0,592-8,-443-6,-305 4,-1 0,1 2,40 11,39 6,287-13,-231-10,-126 1,58-8,-60 4</inkml:trace>
+</inkml:ink>
+</file>
+
+<file path=ppt/ink/ink13.xml><?xml version="1.0" encoding="utf-8"?>
+<inkml:ink xmlns:inkml="http://www.w3.org/2003/InkML">
+  <inkml:definitions>
+    <inkml:context xml:id="ctx0">
+      <inkml:inkSource xml:id="inkSrc0">
+        <inkml:traceFormat>
+          <inkml:channel name="X" type="integer" min="-2.14748E9" max="2.14748E9" units="cm"/>
+          <inkml:channel name="Y" type="integer" min="-2.14748E9" max="2.14748E9" units="cm"/>
+        </inkml:traceFormat>
+        <inkml:channelProperties>
+          <inkml:channelProperty channel="X" name="resolution" value="1000" units="1/cm"/>
+          <inkml:channelProperty channel="Y" name="resolution" value="1000" units="1/cm"/>
+        </inkml:channelProperties>
+      </inkml:inkSource>
+      <inkml:timestamp xml:id="ts0" timeString="2022-04-07T20:41:29.415"/>
+    </inkml:context>
+    <inkml:brush xml:id="br0">
+      <inkml:brushProperty name="width" value="0.3" units="cm"/>
+      <inkml:brushProperty name="height" value="0.6" units="cm"/>
+      <inkml:brushProperty name="color" value="#FF8517"/>
+      <inkml:brushProperty name="tip" value="rectangle"/>
+      <inkml:brushProperty name="rasterOp" value="maskPen"/>
+      <inkml:brushProperty name="ignorePressure" value="1"/>
+    </inkml:brush>
+  </inkml:definitions>
+  <inkml:trace contextRef="#ctx0" brushRef="#br0">1 132,'1020'0,"-999"-2,-1-1,1-1,-1 0,0-2,0 0,-1-2,1 0,25-15,55-21,-83 38,1 1,0 1,1 1,-1 0,0 1,28 1,-26 2</inkml:trace>
+</inkml:ink>
+</file>
+
+<file path=ppt/ink/ink14.xml><?xml version="1.0" encoding="utf-8"?>
+<inkml:ink xmlns:inkml="http://www.w3.org/2003/InkML">
+  <inkml:definitions>
+    <inkml:context xml:id="ctx0">
+      <inkml:inkSource xml:id="inkSrc0">
+        <inkml:traceFormat>
+          <inkml:channel name="X" type="integer" min="-2.14748E9" max="2.14748E9" units="cm"/>
+          <inkml:channel name="Y" type="integer" min="-2.14748E9" max="2.14748E9" units="cm"/>
+        </inkml:traceFormat>
+        <inkml:channelProperties>
+          <inkml:channelProperty channel="X" name="resolution" value="1000" units="1/cm"/>
+          <inkml:channelProperty channel="Y" name="resolution" value="1000" units="1/cm"/>
+        </inkml:channelProperties>
+      </inkml:inkSource>
+      <inkml:timestamp xml:id="ts0" timeString="2022-04-07T20:41:30.807"/>
+    </inkml:context>
+    <inkml:brush xml:id="br0">
+      <inkml:brushProperty name="width" value="0.3" units="cm"/>
+      <inkml:brushProperty name="height" value="0.6" units="cm"/>
+      <inkml:brushProperty name="color" value="#FF8517"/>
+      <inkml:brushProperty name="tip" value="rectangle"/>
+      <inkml:brushProperty name="rasterOp" value="maskPen"/>
+      <inkml:brushProperty name="ignorePressure" value="1"/>
+    </inkml:brush>
+  </inkml:definitions>
+  <inkml:trace contextRef="#ctx0" brushRef="#br0">1 1,'712'0,"-691"0</inkml:trace>
+</inkml:ink>
+</file>
+
+<file path=ppt/ink/ink15.xml><?xml version="1.0" encoding="utf-8"?>
+<inkml:ink xmlns:inkml="http://www.w3.org/2003/InkML">
+  <inkml:definitions>
+    <inkml:context xml:id="ctx0">
+      <inkml:inkSource xml:id="inkSrc0">
+        <inkml:traceFormat>
+          <inkml:channel name="X" type="integer" min="-2.14748E9" max="2.14748E9" units="cm"/>
+          <inkml:channel name="Y" type="integer" min="-2.14748E9" max="2.14748E9" units="cm"/>
+        </inkml:traceFormat>
+        <inkml:channelProperties>
+          <inkml:channelProperty channel="X" name="resolution" value="1000" units="1/cm"/>
+          <inkml:channelProperty channel="Y" name="resolution" value="1000" units="1/cm"/>
+        </inkml:channelProperties>
+      </inkml:inkSource>
+      <inkml:timestamp xml:id="ts0" timeString="2022-04-07T20:41:33.589"/>
+    </inkml:context>
+    <inkml:brush xml:id="br0">
+      <inkml:brushProperty name="width" value="0.3" units="cm"/>
+      <inkml:brushProperty name="height" value="0.6" units="cm"/>
+      <inkml:brushProperty name="color" value="#FF8517"/>
+      <inkml:brushProperty name="tip" value="rectangle"/>
+      <inkml:brushProperty name="rasterOp" value="maskPen"/>
+      <inkml:brushProperty name="ignorePressure" value="1"/>
+    </inkml:brush>
+  </inkml:definitions>
+  <inkml:trace contextRef="#ctx0" brushRef="#br0">0 1,'12'1,"0"0,-1 1,1 1,-1 0,19 8,24 6,-11-10,0-3,0-1,74-5,56 3,-77 11,56 2,158-15,-288 1</inkml:trace>
+</inkml:ink>
+</file>
+
+<file path=ppt/ink/ink16.xml><?xml version="1.0" encoding="utf-8"?>
+<inkml:ink xmlns:inkml="http://www.w3.org/2003/InkML">
+  <inkml:definitions>
+    <inkml:context xml:id="ctx0">
+      <inkml:inkSource xml:id="inkSrc0">
+        <inkml:traceFormat>
+          <inkml:channel name="X" type="integer" min="-2.14748E9" max="2.14748E9" units="cm"/>
+          <inkml:channel name="Y" type="integer" min="-2.14748E9" max="2.14748E9" units="cm"/>
+        </inkml:traceFormat>
+        <inkml:channelProperties>
+          <inkml:channelProperty channel="X" name="resolution" value="1000" units="1/cm"/>
+          <inkml:channelProperty channel="Y" name="resolution" value="1000" units="1/cm"/>
+        </inkml:channelProperties>
+      </inkml:inkSource>
+      <inkml:timestamp xml:id="ts0" timeString="2022-04-07T20:41:35.858"/>
+    </inkml:context>
+    <inkml:brush xml:id="br0">
+      <inkml:brushProperty name="width" value="0.3" units="cm"/>
+      <inkml:brushProperty name="height" value="0.6" units="cm"/>
+      <inkml:brushProperty name="color" value="#FF8517"/>
+      <inkml:brushProperty name="tip" value="rectangle"/>
+      <inkml:brushProperty name="rasterOp" value="maskPen"/>
+      <inkml:brushProperty name="ignorePressure" value="1"/>
+    </inkml:brush>
+  </inkml:definitions>
+  <inkml:trace contextRef="#ctx0" brushRef="#br0">0 53,'122'2,"135"-4,-232-1,0-1,-1-1,25-8,-24 6,0 0,0 2,28-2,280 6,-161 3,-128 0,-1 2,66 16,-66-11,0-2,66 3,-88-10</inkml:trace>
+</inkml:ink>
+</file>
+
+<file path=ppt/ink/ink17.xml><?xml version="1.0" encoding="utf-8"?>
+<inkml:ink xmlns:inkml="http://www.w3.org/2003/InkML">
+  <inkml:definitions>
+    <inkml:context xml:id="ctx0">
+      <inkml:inkSource xml:id="inkSrc0">
+        <inkml:traceFormat>
+          <inkml:channel name="X" type="integer" min="-2.14748E9" max="2.14748E9" units="cm"/>
+          <inkml:channel name="Y" type="integer" min="-2.14748E9" max="2.14748E9" units="cm"/>
+        </inkml:traceFormat>
+        <inkml:channelProperties>
+          <inkml:channelProperty channel="X" name="resolution" value="1000" units="1/cm"/>
+          <inkml:channelProperty channel="Y" name="resolution" value="1000" units="1/cm"/>
+        </inkml:channelProperties>
+      </inkml:inkSource>
+      <inkml:timestamp xml:id="ts0" timeString="2022-04-07T20:41:39.999"/>
+    </inkml:context>
+    <inkml:brush xml:id="br0">
+      <inkml:brushProperty name="width" value="0.3" units="cm"/>
+      <inkml:brushProperty name="height" value="0.6" units="cm"/>
+      <inkml:brushProperty name="color" value="#FF8517"/>
+      <inkml:brushProperty name="tip" value="rectangle"/>
+      <inkml:brushProperty name="rasterOp" value="maskPen"/>
+      <inkml:brushProperty name="ignorePressure" value="1"/>
+    </inkml:brush>
+  </inkml:definitions>
+  <inkml:trace contextRef="#ctx0" brushRef="#br0">0 1,'3'4,"-1"1,1-1,0 0,0 0,1-1,-1 1,1-1,0 1,0-1,0 0,0-1,1 1,-1-1,9 4,7 1,0-1,28 5,4 1,-8 1,85 13,143-2,782-24,-1028-2,0 0,28-7,45-4,-18 1,-6-1,-49 12</inkml:trace>
+</inkml:ink>
+</file>
+
+<file path=ppt/ink/ink18.xml><?xml version="1.0" encoding="utf-8"?>
 <inkml:ink xmlns:inkml="http://www.w3.org/2003/InkML">
   <inkml:definitions>
     <inkml:context xml:id="ctx0">
@@ -208,7 +440,7 @@
 </inkml:ink>
 </file>
 
-<file path=ppt/ink/ink11.xml><?xml version="1.0" encoding="utf-8"?>
+<file path=ppt/ink/ink19.xml><?xml version="1.0" encoding="utf-8"?>
 <inkml:ink xmlns:inkml="http://www.w3.org/2003/InkML">
   <inkml:definitions>
     <inkml:context xml:id="ctx0">
@@ -237,7 +469,36 @@
 </inkml:ink>
 </file>
 
-<file path=ppt/ink/ink12.xml><?xml version="1.0" encoding="utf-8"?>
+<file path=ppt/ink/ink2.xml><?xml version="1.0" encoding="utf-8"?>
+<inkml:ink xmlns:inkml="http://www.w3.org/2003/InkML">
+  <inkml:definitions>
+    <inkml:context xml:id="ctx0">
+      <inkml:inkSource xml:id="inkSrc0">
+        <inkml:traceFormat>
+          <inkml:channel name="X" type="integer" min="-2.14748E9" max="2.14748E9" units="cm"/>
+          <inkml:channel name="Y" type="integer" min="-2.14748E9" max="2.14748E9" units="cm"/>
+        </inkml:traceFormat>
+        <inkml:channelProperties>
+          <inkml:channelProperty channel="X" name="resolution" value="1000" units="1/cm"/>
+          <inkml:channelProperty channel="Y" name="resolution" value="1000" units="1/cm"/>
+        </inkml:channelProperties>
+      </inkml:inkSource>
+      <inkml:timestamp xml:id="ts0" timeString="2022-04-08T15:12:44.727"/>
+    </inkml:context>
+    <inkml:brush xml:id="br0">
+      <inkml:brushProperty name="width" value="0.3" units="cm"/>
+      <inkml:brushProperty name="height" value="0.6" units="cm"/>
+      <inkml:brushProperty name="color" value="#E6E6E6"/>
+      <inkml:brushProperty name="tip" value="rectangle"/>
+      <inkml:brushProperty name="rasterOp" value="maskPen"/>
+      <inkml:brushProperty name="ignorePressure" value="1"/>
+    </inkml:brush>
+  </inkml:definitions>
+  <inkml:trace contextRef="#ctx0" brushRef="#br0">1 0,'1376'0,"-1348"0</inkml:trace>
+</inkml:ink>
+</file>
+
+<file path=ppt/ink/ink20.xml><?xml version="1.0" encoding="utf-8"?>
 <inkml:ink xmlns:inkml="http://www.w3.org/2003/InkML">
   <inkml:definitions>
     <inkml:context xml:id="ctx0">
@@ -266,7 +527,7 @@
 </inkml:ink>
 </file>
 
-<file path=ppt/ink/ink13.xml><?xml version="1.0" encoding="utf-8"?>
+<file path=ppt/ink/ink21.xml><?xml version="1.0" encoding="utf-8"?>
 <inkml:ink xmlns:inkml="http://www.w3.org/2003/InkML">
   <inkml:definitions>
     <inkml:context xml:id="ctx0">
@@ -295,7 +556,7 @@
 </inkml:ink>
 </file>
 
-<file path=ppt/ink/ink14.xml><?xml version="1.0" encoding="utf-8"?>
+<file path=ppt/ink/ink22.xml><?xml version="1.0" encoding="utf-8"?>
 <inkml:ink xmlns:inkml="http://www.w3.org/2003/InkML">
   <inkml:definitions>
     <inkml:context xml:id="ctx0">
@@ -324,7 +585,7 @@
 </inkml:ink>
 </file>
 
-<file path=ppt/ink/ink15.xml><?xml version="1.0" encoding="utf-8"?>
+<file path=ppt/ink/ink23.xml><?xml version="1.0" encoding="utf-8"?>
 <inkml:ink xmlns:inkml="http://www.w3.org/2003/InkML">
   <inkml:definitions>
     <inkml:context xml:id="ctx0">
@@ -353,7 +614,7 @@
 </inkml:ink>
 </file>
 
-<file path=ppt/ink/ink16.xml><?xml version="1.0" encoding="utf-8"?>
+<file path=ppt/ink/ink24.xml><?xml version="1.0" encoding="utf-8"?>
 <inkml:ink xmlns:inkml="http://www.w3.org/2003/InkML">
   <inkml:definitions>
     <inkml:context xml:id="ctx0">
@@ -382,7 +643,7 @@
 </inkml:ink>
 </file>
 
-<file path=ppt/ink/ink17.xml><?xml version="1.0" encoding="utf-8"?>
+<file path=ppt/ink/ink25.xml><?xml version="1.0" encoding="utf-8"?>
 <inkml:ink xmlns:inkml="http://www.w3.org/2003/InkML">
   <inkml:definitions>
     <inkml:context xml:id="ctx0">
@@ -411,7 +672,7 @@
 </inkml:ink>
 </file>
 
-<file path=ppt/ink/ink18.xml><?xml version="1.0" encoding="utf-8"?>
+<file path=ppt/ink/ink26.xml><?xml version="1.0" encoding="utf-8"?>
 <inkml:ink xmlns:inkml="http://www.w3.org/2003/InkML">
   <inkml:definitions>
     <inkml:context xml:id="ctx0">
@@ -440,7 +701,7 @@
 </inkml:ink>
 </file>
 
-<file path=ppt/ink/ink19.xml><?xml version="1.0" encoding="utf-8"?>
+<file path=ppt/ink/ink27.xml><?xml version="1.0" encoding="utf-8"?>
 <inkml:ink xmlns:inkml="http://www.w3.org/2003/InkML">
   <inkml:definitions>
     <inkml:context xml:id="ctx0">
@@ -469,36 +730,7 @@
 </inkml:ink>
 </file>
 
-<file path=ppt/ink/ink2.xml><?xml version="1.0" encoding="utf-8"?>
-<inkml:ink xmlns:inkml="http://www.w3.org/2003/InkML">
-  <inkml:definitions>
-    <inkml:context xml:id="ctx0">
-      <inkml:inkSource xml:id="inkSrc0">
-        <inkml:traceFormat>
-          <inkml:channel name="X" type="integer" min="-2.14748E9" max="2.14748E9" units="cm"/>
-          <inkml:channel name="Y" type="integer" min="-2.14748E9" max="2.14748E9" units="cm"/>
-        </inkml:traceFormat>
-        <inkml:channelProperties>
-          <inkml:channelProperty channel="X" name="resolution" value="1000" units="1/cm"/>
-          <inkml:channelProperty channel="Y" name="resolution" value="1000" units="1/cm"/>
-        </inkml:channelProperties>
-      </inkml:inkSource>
-      <inkml:timestamp xml:id="ts0" timeString="2022-04-07T20:41:11.241"/>
-    </inkml:context>
-    <inkml:brush xml:id="br0">
-      <inkml:brushProperty name="width" value="0.3" units="cm"/>
-      <inkml:brushProperty name="height" value="0.6" units="cm"/>
-      <inkml:brushProperty name="color" value="#FFFC00"/>
-      <inkml:brushProperty name="tip" value="rectangle"/>
-      <inkml:brushProperty name="rasterOp" value="maskPen"/>
-      <inkml:brushProperty name="ignorePressure" value="1"/>
-    </inkml:brush>
-  </inkml:definitions>
-  <inkml:trace contextRef="#ctx0" brushRef="#br0">1 1,'1396'0,"-1373"0</inkml:trace>
-</inkml:ink>
-</file>
-
-<file path=ppt/ink/ink20.xml><?xml version="1.0" encoding="utf-8"?>
+<file path=ppt/ink/ink28.xml><?xml version="1.0" encoding="utf-8"?>
 <inkml:ink xmlns:inkml="http://www.w3.org/2003/InkML">
   <inkml:definitions>
     <inkml:context xml:id="ctx0">
@@ -527,7 +759,7 @@
 </inkml:ink>
 </file>
 
-<file path=ppt/ink/ink21.xml><?xml version="1.0" encoding="utf-8"?>
+<file path=ppt/ink/ink29.xml><?xml version="1.0" encoding="utf-8"?>
 <inkml:ink xmlns:inkml="http://www.w3.org/2003/InkML">
   <inkml:definitions>
     <inkml:context xml:id="ctx0">
@@ -556,7 +788,36 @@
 </inkml:ink>
 </file>
 
-<file path=ppt/ink/ink22.xml><?xml version="1.0" encoding="utf-8"?>
+<file path=ppt/ink/ink3.xml><?xml version="1.0" encoding="utf-8"?>
+<inkml:ink xmlns:inkml="http://www.w3.org/2003/InkML">
+  <inkml:definitions>
+    <inkml:context xml:id="ctx0">
+      <inkml:inkSource xml:id="inkSrc0">
+        <inkml:traceFormat>
+          <inkml:channel name="X" type="integer" min="-2.14748E9" max="2.14748E9" units="cm"/>
+          <inkml:channel name="Y" type="integer" min="-2.14748E9" max="2.14748E9" units="cm"/>
+        </inkml:traceFormat>
+        <inkml:channelProperties>
+          <inkml:channelProperty channel="X" name="resolution" value="1000" units="1/cm"/>
+          <inkml:channelProperty channel="Y" name="resolution" value="1000" units="1/cm"/>
+        </inkml:channelProperties>
+      </inkml:inkSource>
+      <inkml:timestamp xml:id="ts0" timeString="2022-04-08T15:12:45.057"/>
+    </inkml:context>
+    <inkml:brush xml:id="br0">
+      <inkml:brushProperty name="width" value="0.3" units="cm"/>
+      <inkml:brushProperty name="height" value="0.6" units="cm"/>
+      <inkml:brushProperty name="color" value="#E6E6E6"/>
+      <inkml:brushProperty name="tip" value="rectangle"/>
+      <inkml:brushProperty name="rasterOp" value="maskPen"/>
+      <inkml:brushProperty name="ignorePressure" value="1"/>
+    </inkml:brush>
+  </inkml:definitions>
+  <inkml:trace contextRef="#ctx0" brushRef="#br0">1 1,'0'0</inkml:trace>
+</inkml:ink>
+</file>
+
+<file path=ppt/ink/ink30.xml><?xml version="1.0" encoding="utf-8"?>
 <inkml:ink xmlns:inkml="http://www.w3.org/2003/InkML">
   <inkml:definitions>
     <inkml:context xml:id="ctx0">
@@ -585,7 +846,7 @@
 </inkml:ink>
 </file>
 
-<file path=ppt/ink/ink23.xml><?xml version="1.0" encoding="utf-8"?>
+<file path=ppt/ink/ink31.xml><?xml version="1.0" encoding="utf-8"?>
 <inkml:ink xmlns:inkml="http://www.w3.org/2003/InkML">
   <inkml:definitions>
     <inkml:context xml:id="ctx0">
@@ -614,7 +875,7 @@
 </inkml:ink>
 </file>
 
-<file path=ppt/ink/ink24.xml><?xml version="1.0" encoding="utf-8"?>
+<file path=ppt/ink/ink32.xml><?xml version="1.0" encoding="utf-8"?>
 <inkml:ink xmlns:inkml="http://www.w3.org/2003/InkML">
   <inkml:definitions>
     <inkml:context xml:id="ctx0">
@@ -643,7 +904,7 @@
 </inkml:ink>
 </file>
 
-<file path=ppt/ink/ink3.xml><?xml version="1.0" encoding="utf-8"?>
+<file path=ppt/ink/ink33.xml><?xml version="1.0" encoding="utf-8"?>
 <inkml:ink xmlns:inkml="http://www.w3.org/2003/InkML">
   <inkml:definitions>
     <inkml:context xml:id="ctx0">
@@ -657,18 +918,47 @@
           <inkml:channelProperty channel="Y" name="resolution" value="1000" units="1/cm"/>
         </inkml:channelProperties>
       </inkml:inkSource>
-      <inkml:timestamp xml:id="ts0" timeString="2022-04-07T20:41:14.341"/>
+      <inkml:timestamp xml:id="ts0" timeString="2022-04-08T15:00:17.425"/>
     </inkml:context>
     <inkml:brush xml:id="br0">
       <inkml:brushProperty name="width" value="0.3" units="cm"/>
       <inkml:brushProperty name="height" value="0.6" units="cm"/>
-      <inkml:brushProperty name="color" value="#FFFC00"/>
+      <inkml:brushProperty name="color" value="#A2D762"/>
       <inkml:brushProperty name="tip" value="rectangle"/>
       <inkml:brushProperty name="rasterOp" value="maskPen"/>
       <inkml:brushProperty name="ignorePressure" value="1"/>
     </inkml:brush>
   </inkml:definitions>
-  <inkml:trace contextRef="#ctx0" brushRef="#br0">0 0,'109'5,"0"5,129 28,-238-38,89 13,128 3,92-18,-99-1,426 3,-609 0</inkml:trace>
+  <inkml:trace contextRef="#ctx0" brushRef="#br0">0 1,'2236'0,"-2214"0</inkml:trace>
+</inkml:ink>
+</file>
+
+<file path=ppt/ink/ink34.xml><?xml version="1.0" encoding="utf-8"?>
+<inkml:ink xmlns:inkml="http://www.w3.org/2003/InkML">
+  <inkml:definitions>
+    <inkml:context xml:id="ctx0">
+      <inkml:inkSource xml:id="inkSrc0">
+        <inkml:traceFormat>
+          <inkml:channel name="X" type="integer" min="-2.14748E9" max="2.14748E9" units="cm"/>
+          <inkml:channel name="Y" type="integer" min="-2.14748E9" max="2.14748E9" units="cm"/>
+        </inkml:traceFormat>
+        <inkml:channelProperties>
+          <inkml:channelProperty channel="X" name="resolution" value="1000" units="1/cm"/>
+          <inkml:channelProperty channel="Y" name="resolution" value="1000" units="1/cm"/>
+        </inkml:channelProperties>
+      </inkml:inkSource>
+      <inkml:timestamp xml:id="ts0" timeString="2022-04-08T15:00:27.551"/>
+    </inkml:context>
+    <inkml:brush xml:id="br0">
+      <inkml:brushProperty name="width" value="0.3" units="cm"/>
+      <inkml:brushProperty name="height" value="0.6" units="cm"/>
+      <inkml:brushProperty name="color" value="#E6E6E6"/>
+      <inkml:brushProperty name="tip" value="rectangle"/>
+      <inkml:brushProperty name="rasterOp" value="maskPen"/>
+      <inkml:brushProperty name="ignorePressure" value="1"/>
+    </inkml:brush>
+  </inkml:definitions>
+  <inkml:trace contextRef="#ctx0" brushRef="#br0">0 0,'32'2,"51"8,22 2,756-8,-440-7,-374 1,-30 1,-1 0,0 1,1 1,-1 0,25 6,-40-7,-1-1,0 1,0 0,1 0,-1 0,0 0,1 0,-1 0,0 1,1-1,-1 0,0 0,1 0,-1 0,0 0,0 0,1 0,-1 1,0-1,1 0,-1 0,0 0,0 1,0-1,1 0,-1 0,0 1,0-1,0 0,1 0,-1 1,0-1,0 0,0 1,0-1,0 0,0 1,0-1,0 0,0 1,0-1,0 0,0 0,0 1,0-1,0 1,-17 8,-29 3,-111 16,-306 13,352-40,-205-24,272 18,-51 0,55 5,-74-11,64 1,7 0,-1 3,-47-2,69 9</inkml:trace>
 </inkml:ink>
 </file>
 
@@ -686,18 +976,18 @@
           <inkml:channelProperty channel="Y" name="resolution" value="1000" units="1/cm"/>
         </inkml:channelProperties>
       </inkml:inkSource>
-      <inkml:timestamp xml:id="ts0" timeString="2022-04-07T20:41:17.138"/>
+      <inkml:timestamp xml:id="ts0" timeString="2022-04-08T15:12:45.418"/>
     </inkml:context>
     <inkml:brush xml:id="br0">
       <inkml:brushProperty name="width" value="0.3" units="cm"/>
       <inkml:brushProperty name="height" value="0.6" units="cm"/>
-      <inkml:brushProperty name="color" value="#FFFC00"/>
+      <inkml:brushProperty name="color" value="#E6E6E6"/>
       <inkml:brushProperty name="tip" value="rectangle"/>
       <inkml:brushProperty name="rasterOp" value="maskPen"/>
       <inkml:brushProperty name="ignorePressure" value="1"/>
     </inkml:brush>
   </inkml:definitions>
-  <inkml:trace contextRef="#ctx0" brushRef="#br0">1 0,'224'12,"-45"0,592-8,-443-6,-305 4,-1 0,1 2,40 11,39 6,287-13,-231-10,-126 1,58-8,-60 4</inkml:trace>
+  <inkml:trace contextRef="#ctx0" brushRef="#br0">0 1,'0'0</inkml:trace>
 </inkml:ink>
 </file>
 
@@ -715,18 +1005,18 @@
           <inkml:channelProperty channel="Y" name="resolution" value="1000" units="1/cm"/>
         </inkml:channelProperties>
       </inkml:inkSource>
-      <inkml:timestamp xml:id="ts0" timeString="2022-04-07T20:41:29.415"/>
+      <inkml:timestamp xml:id="ts0" timeString="2022-04-08T15:12:45.763"/>
     </inkml:context>
     <inkml:brush xml:id="br0">
       <inkml:brushProperty name="width" value="0.3" units="cm"/>
       <inkml:brushProperty name="height" value="0.6" units="cm"/>
-      <inkml:brushProperty name="color" value="#FF8517"/>
+      <inkml:brushProperty name="color" value="#E6E6E6"/>
       <inkml:brushProperty name="tip" value="rectangle"/>
       <inkml:brushProperty name="rasterOp" value="maskPen"/>
       <inkml:brushProperty name="ignorePressure" value="1"/>
     </inkml:brush>
   </inkml:definitions>
-  <inkml:trace contextRef="#ctx0" brushRef="#br0">1 132,'1020'0,"-999"-2,-1-1,1-1,-1 0,0-2,0 0,-1-2,1 0,25-15,55-21,-83 38,1 1,0 1,1 1,-1 0,0 1,28 1,-26 2</inkml:trace>
+  <inkml:trace contextRef="#ctx0" brushRef="#br0">0 1,'0'0</inkml:trace>
 </inkml:ink>
 </file>
 
@@ -744,18 +1034,18 @@
           <inkml:channelProperty channel="Y" name="resolution" value="1000" units="1/cm"/>
         </inkml:channelProperties>
       </inkml:inkSource>
-      <inkml:timestamp xml:id="ts0" timeString="2022-04-07T20:41:30.807"/>
+      <inkml:timestamp xml:id="ts0" timeString="2022-04-08T15:12:46.943"/>
     </inkml:context>
     <inkml:brush xml:id="br0">
       <inkml:brushProperty name="width" value="0.3" units="cm"/>
       <inkml:brushProperty name="height" value="0.6" units="cm"/>
-      <inkml:brushProperty name="color" value="#FF8517"/>
+      <inkml:brushProperty name="color" value="#E6E6E6"/>
       <inkml:brushProperty name="tip" value="rectangle"/>
       <inkml:brushProperty name="rasterOp" value="maskPen"/>
       <inkml:brushProperty name="ignorePressure" value="1"/>
     </inkml:brush>
   </inkml:definitions>
-  <inkml:trace contextRef="#ctx0" brushRef="#br0">1 1,'712'0,"-691"0</inkml:trace>
+  <inkml:trace contextRef="#ctx0" brushRef="#br0">0 1,'0'0</inkml:trace>
 </inkml:ink>
 </file>
 
@@ -773,18 +1063,18 @@
           <inkml:channelProperty channel="Y" name="resolution" value="1000" units="1/cm"/>
         </inkml:channelProperties>
       </inkml:inkSource>
-      <inkml:timestamp xml:id="ts0" timeString="2022-04-07T20:41:33.589"/>
+      <inkml:timestamp xml:id="ts0" timeString="2022-04-08T15:12:50.258"/>
     </inkml:context>
     <inkml:brush xml:id="br0">
       <inkml:brushProperty name="width" value="0.3" units="cm"/>
       <inkml:brushProperty name="height" value="0.6" units="cm"/>
-      <inkml:brushProperty name="color" value="#FF8517"/>
+      <inkml:brushProperty name="color" value="#E6E6E6"/>
       <inkml:brushProperty name="tip" value="rectangle"/>
       <inkml:brushProperty name="rasterOp" value="maskPen"/>
       <inkml:brushProperty name="ignorePressure" value="1"/>
     </inkml:brush>
   </inkml:definitions>
-  <inkml:trace contextRef="#ctx0" brushRef="#br0">0 1,'12'1,"0"0,-1 1,1 1,-1 0,19 8,24 6,-11-10,0-3,0-1,74-5,56 3,-77 11,56 2,158-15,-288 1</inkml:trace>
+  <inkml:trace contextRef="#ctx0" brushRef="#br0">1 0,'52'3,"76"12,-36-2,669 7,-498-23,-3 3,-238 0</inkml:trace>
 </inkml:ink>
 </file>
 
@@ -802,18 +1092,18 @@
           <inkml:channelProperty channel="Y" name="resolution" value="1000" units="1/cm"/>
         </inkml:channelProperties>
       </inkml:inkSource>
-      <inkml:timestamp xml:id="ts0" timeString="2022-04-07T20:41:35.858"/>
+      <inkml:timestamp xml:id="ts0" timeString="2022-04-08T14:48:35.204"/>
     </inkml:context>
     <inkml:brush xml:id="br0">
       <inkml:brushProperty name="width" value="0.3" units="cm"/>
       <inkml:brushProperty name="height" value="0.6" units="cm"/>
-      <inkml:brushProperty name="color" value="#FF8517"/>
+      <inkml:brushProperty name="color" value="#E6E6E6"/>
       <inkml:brushProperty name="tip" value="rectangle"/>
       <inkml:brushProperty name="rasterOp" value="maskPen"/>
       <inkml:brushProperty name="ignorePressure" value="1"/>
     </inkml:brush>
   </inkml:definitions>
-  <inkml:trace contextRef="#ctx0" brushRef="#br0">0 53,'122'2,"135"-4,-232-1,0-1,-1-1,25-8,-24 6,0 0,0 2,28-2,280 6,-161 3,-128 0,-1 2,66 16,-66-11,0-2,66 3,-88-10</inkml:trace>
+  <inkml:trace contextRef="#ctx0" brushRef="#br0">0 1,'0'0</inkml:trace>
 </inkml:ink>
 </file>
 
@@ -831,18 +1121,18 @@
           <inkml:channelProperty channel="Y" name="resolution" value="1000" units="1/cm"/>
         </inkml:channelProperties>
       </inkml:inkSource>
-      <inkml:timestamp xml:id="ts0" timeString="2022-04-07T20:41:39.999"/>
+      <inkml:timestamp xml:id="ts0" timeString="2022-04-07T20:41:08.190"/>
     </inkml:context>
     <inkml:brush xml:id="br0">
       <inkml:brushProperty name="width" value="0.3" units="cm"/>
       <inkml:brushProperty name="height" value="0.6" units="cm"/>
-      <inkml:brushProperty name="color" value="#FF8517"/>
+      <inkml:brushProperty name="color" value="#FFFC00"/>
       <inkml:brushProperty name="tip" value="rectangle"/>
       <inkml:brushProperty name="rasterOp" value="maskPen"/>
       <inkml:brushProperty name="ignorePressure" value="1"/>
     </inkml:brush>
   </inkml:definitions>
-  <inkml:trace contextRef="#ctx0" brushRef="#br0">0 1,'3'4,"-1"1,1-1,0 0,0 0,1-1,-1 1,1-1,0 1,0-1,0 0,0-1,1 1,-1-1,9 4,7 1,0-1,28 5,4 1,-8 1,85 13,143-2,782-24,-1028-2,0 0,28-7,45-4,-18 1,-6-1,-49 12</inkml:trace>
+  <inkml:trace contextRef="#ctx0" brushRef="#br0">1 53,'1606'0,"-1584"-1,0-2,-1 0,1-2,29-9,-28 7,-1 1,1 1,46-3,7 8,-54 0</inkml:trace>
 </inkml:ink>
 </file>
 
@@ -13747,8 +14037,8 @@
         </p:blipFill>
         <p:spPr>
           <a:xfrm>
-            <a:off x="2294626" y="1492370"/>
-            <a:ext cx="7082287" cy="4778255"/>
+            <a:off x="1932317" y="1492370"/>
+            <a:ext cx="7850037" cy="4778255"/>
           </a:xfrm>
         </p:spPr>
       </p:pic>
@@ -17575,7 +17865,7 @@
         </p:spPr>
         <p:txBody>
           <a:bodyPr vert="horz" lIns="91440" tIns="45720" rIns="91440" bIns="45720" rtlCol="0" anchor="t">
-            <a:normAutofit/>
+            <a:normAutofit fontScale="92500"/>
           </a:bodyPr>
           <a:lstStyle/>
           <a:p>
@@ -17601,7 +17891,7 @@
             </a:pPr>
             <a:r>
               <a:rPr lang="en-US" sz="2400" dirty="0"/>
-              <a:t>Several models will be developed, and one will be chosen to create an optimal price determination tool.</a:t>
+              <a:t>Several models were developed, and some were shortlisted to create an optimal price determination tool.</a:t>
             </a:r>
           </a:p>
           <a:p>
@@ -17614,7 +17904,7 @@
             </a:pPr>
             <a:r>
               <a:rPr lang="en-US" sz="2400" dirty="0"/>
-              <a:t>Let us start with listing some universal factors that affect house sales:</a:t>
+              <a:t>Let us start with listing some universal factors that affect house sales price:</a:t>
             </a:r>
           </a:p>
           <a:p>
@@ -19652,6 +19942,57 @@
           </a:p>
         </p:txBody>
       </p:sp>
+      <mc:AlternateContent xmlns:mc="http://schemas.openxmlformats.org/markup-compatibility/2006">
+        <mc:Choice xmlns:p14="http://schemas.microsoft.com/office/powerpoint/2010/main" Requires="p14">
+          <p:contentPart p14:bwMode="auto" r:id="rId2">
+            <p14:nvContentPartPr>
+              <p14:cNvPr id="3" name="Ink 2">
+                <a:extLst>
+                  <a:ext uri="{FF2B5EF4-FFF2-40B4-BE49-F238E27FC236}">
+                    <a16:creationId xmlns:a16="http://schemas.microsoft.com/office/drawing/2014/main" id="{92129810-9352-4B1A-B8E4-94F113882079}"/>
+                  </a:ext>
+                </a:extLst>
+              </p14:cNvPr>
+              <p14:cNvContentPartPr/>
+              <p14:nvPr/>
+            </p14:nvContentPartPr>
+            <p14:xfrm>
+              <a:off x="457272" y="5284872"/>
+              <a:ext cx="360" cy="360"/>
+            </p14:xfrm>
+          </p:contentPart>
+        </mc:Choice>
+        <mc:Fallback>
+          <p:pic>
+            <p:nvPicPr>
+              <p:cNvPr id="3" name="Ink 2">
+                <a:extLst>
+                  <a:ext uri="{FF2B5EF4-FFF2-40B4-BE49-F238E27FC236}">
+                    <a16:creationId xmlns:a16="http://schemas.microsoft.com/office/drawing/2014/main" id="{92129810-9352-4B1A-B8E4-94F113882079}"/>
+                  </a:ext>
+                </a:extLst>
+              </p:cNvPr>
+              <p:cNvPicPr/>
+              <p:nvPr/>
+            </p:nvPicPr>
+            <p:blipFill>
+              <a:blip r:embed="rId3"/>
+              <a:stretch>
+                <a:fillRect/>
+              </a:stretch>
+            </p:blipFill>
+            <p:spPr>
+              <a:xfrm>
+                <a:off x="403272" y="5177232"/>
+                <a:ext cx="108000" cy="216000"/>
+              </a:xfrm>
+              <a:prstGeom prst="rect">
+                <a:avLst/>
+              </a:prstGeom>
+            </p:spPr>
+          </p:pic>
+        </mc:Fallback>
+      </mc:AlternateContent>
     </p:spTree>
     <p:extLst>
       <p:ext uri="{BB962C8B-B14F-4D97-AF65-F5344CB8AC3E}">
@@ -21223,6 +21564,108 @@
           </p:pic>
         </mc:Fallback>
       </mc:AlternateContent>
+      <mc:AlternateContent xmlns:mc="http://schemas.openxmlformats.org/markup-compatibility/2006">
+        <mc:Choice xmlns:p14="http://schemas.microsoft.com/office/powerpoint/2010/main" Requires="p14">
+          <p:contentPart p14:bwMode="auto" r:id="rId54">
+            <p14:nvContentPartPr>
+              <p14:cNvPr id="39" name="Ink 38">
+                <a:extLst>
+                  <a:ext uri="{FF2B5EF4-FFF2-40B4-BE49-F238E27FC236}">
+                    <a16:creationId xmlns:a16="http://schemas.microsoft.com/office/drawing/2014/main" id="{9CD344B8-7E0A-4248-B731-ACC1B91543A2}"/>
+                  </a:ext>
+                </a:extLst>
+              </p14:cNvPr>
+              <p14:cNvContentPartPr/>
+              <p14:nvPr/>
+            </p14:nvContentPartPr>
+            <p14:xfrm>
+              <a:off x="9683352" y="3895272"/>
+              <a:ext cx="813240" cy="360"/>
+            </p14:xfrm>
+          </p:contentPart>
+        </mc:Choice>
+        <mc:Fallback>
+          <p:pic>
+            <p:nvPicPr>
+              <p:cNvPr id="39" name="Ink 38">
+                <a:extLst>
+                  <a:ext uri="{FF2B5EF4-FFF2-40B4-BE49-F238E27FC236}">
+                    <a16:creationId xmlns:a16="http://schemas.microsoft.com/office/drawing/2014/main" id="{9CD344B8-7E0A-4248-B731-ACC1B91543A2}"/>
+                  </a:ext>
+                </a:extLst>
+              </p:cNvPr>
+              <p:cNvPicPr/>
+              <p:nvPr/>
+            </p:nvPicPr>
+            <p:blipFill>
+              <a:blip r:embed="rId55"/>
+              <a:stretch>
+                <a:fillRect/>
+              </a:stretch>
+            </p:blipFill>
+            <p:spPr>
+              <a:xfrm>
+                <a:off x="9629352" y="3787632"/>
+                <a:ext cx="920880" cy="216000"/>
+              </a:xfrm>
+              <a:prstGeom prst="rect">
+                <a:avLst/>
+              </a:prstGeom>
+            </p:spPr>
+          </p:pic>
+        </mc:Fallback>
+      </mc:AlternateContent>
+      <mc:AlternateContent xmlns:mc="http://schemas.openxmlformats.org/markup-compatibility/2006">
+        <mc:Choice xmlns:p14="http://schemas.microsoft.com/office/powerpoint/2010/main" Requires="p14">
+          <p:contentPart p14:bwMode="auto" r:id="rId56">
+            <p14:nvContentPartPr>
+              <p14:cNvPr id="40" name="Ink 39">
+                <a:extLst>
+                  <a:ext uri="{FF2B5EF4-FFF2-40B4-BE49-F238E27FC236}">
+                    <a16:creationId xmlns:a16="http://schemas.microsoft.com/office/drawing/2014/main" id="{89D780FC-E418-44A7-BAD9-7A1145455EB8}"/>
+                  </a:ext>
+                </a:extLst>
+              </p14:cNvPr>
+              <p14:cNvContentPartPr/>
+              <p14:nvPr/>
+            </p14:nvContentPartPr>
+            <p14:xfrm>
+              <a:off x="9911952" y="4133232"/>
+              <a:ext cx="605520" cy="47160"/>
+            </p14:xfrm>
+          </p:contentPart>
+        </mc:Choice>
+        <mc:Fallback>
+          <p:pic>
+            <p:nvPicPr>
+              <p:cNvPr id="40" name="Ink 39">
+                <a:extLst>
+                  <a:ext uri="{FF2B5EF4-FFF2-40B4-BE49-F238E27FC236}">
+                    <a16:creationId xmlns:a16="http://schemas.microsoft.com/office/drawing/2014/main" id="{89D780FC-E418-44A7-BAD9-7A1145455EB8}"/>
+                  </a:ext>
+                </a:extLst>
+              </p:cNvPr>
+              <p:cNvPicPr/>
+              <p:nvPr/>
+            </p:nvPicPr>
+            <p:blipFill>
+              <a:blip r:embed="rId57"/>
+              <a:stretch>
+                <a:fillRect/>
+              </a:stretch>
+            </p:blipFill>
+            <p:spPr>
+              <a:xfrm>
+                <a:off x="9857952" y="4025232"/>
+                <a:ext cx="713160" cy="262800"/>
+              </a:xfrm>
+              <a:prstGeom prst="rect">
+                <a:avLst/>
+              </a:prstGeom>
+            </p:spPr>
+          </p:pic>
+        </mc:Fallback>
+      </mc:AlternateContent>
     </p:spTree>
     <p:extLst>
       <p:ext uri="{BB962C8B-B14F-4D97-AF65-F5344CB8AC3E}">
@@ -21344,7 +21787,7 @@
           <a:p>
             <a:r>
               <a:rPr lang="en-US" sz="3600" dirty="0"/>
-              <a:t>What does sales data from Ames, Iowa tell us?</a:t>
+              <a:t>What does house sales data from Ames, Iowa tell us?</a:t>
             </a:r>
           </a:p>
         </p:txBody>
@@ -21501,6 +21944,363 @@
           </a:p>
         </p:txBody>
       </p:sp>
+      <mc:AlternateContent xmlns:mc="http://schemas.openxmlformats.org/markup-compatibility/2006">
+        <mc:Choice xmlns:p14="http://schemas.microsoft.com/office/powerpoint/2010/main" Requires="p14">
+          <p:contentPart p14:bwMode="auto" r:id="rId2">
+            <p14:nvContentPartPr>
+              <p14:cNvPr id="7" name="Ink 6">
+                <a:extLst>
+                  <a:ext uri="{FF2B5EF4-FFF2-40B4-BE49-F238E27FC236}">
+                    <a16:creationId xmlns:a16="http://schemas.microsoft.com/office/drawing/2014/main" id="{29794B2E-BC54-477B-A8AE-DDE5B39460DF}"/>
+                  </a:ext>
+                </a:extLst>
+              </p14:cNvPr>
+              <p14:cNvContentPartPr/>
+              <p14:nvPr/>
+            </p14:nvContentPartPr>
+            <p14:xfrm>
+              <a:off x="6676465" y="3536857"/>
+              <a:ext cx="360" cy="360"/>
+            </p14:xfrm>
+          </p:contentPart>
+        </mc:Choice>
+        <mc:Fallback>
+          <p:pic>
+            <p:nvPicPr>
+              <p:cNvPr id="7" name="Ink 6">
+                <a:extLst>
+                  <a:ext uri="{FF2B5EF4-FFF2-40B4-BE49-F238E27FC236}">
+                    <a16:creationId xmlns:a16="http://schemas.microsoft.com/office/drawing/2014/main" id="{29794B2E-BC54-477B-A8AE-DDE5B39460DF}"/>
+                  </a:ext>
+                </a:extLst>
+              </p:cNvPr>
+              <p:cNvPicPr/>
+              <p:nvPr/>
+            </p:nvPicPr>
+            <p:blipFill>
+              <a:blip r:embed="rId3"/>
+              <a:stretch>
+                <a:fillRect/>
+              </a:stretch>
+            </p:blipFill>
+            <p:spPr>
+              <a:xfrm>
+                <a:off x="6622825" y="3428857"/>
+                <a:ext cx="108000" cy="216000"/>
+              </a:xfrm>
+              <a:prstGeom prst="rect">
+                <a:avLst/>
+              </a:prstGeom>
+            </p:spPr>
+          </p:pic>
+        </mc:Fallback>
+      </mc:AlternateContent>
+      <mc:AlternateContent xmlns:mc="http://schemas.openxmlformats.org/markup-compatibility/2006">
+        <mc:Choice xmlns:p14="http://schemas.microsoft.com/office/powerpoint/2010/main" Requires="p14">
+          <p:contentPart p14:bwMode="auto" r:id="rId4">
+            <p14:nvContentPartPr>
+              <p14:cNvPr id="8" name="Ink 7">
+                <a:extLst>
+                  <a:ext uri="{FF2B5EF4-FFF2-40B4-BE49-F238E27FC236}">
+                    <a16:creationId xmlns:a16="http://schemas.microsoft.com/office/drawing/2014/main" id="{68F3BDD3-BD31-4B8F-B614-F5C8217DD7CA}"/>
+                  </a:ext>
+                </a:extLst>
+              </p14:cNvPr>
+              <p14:cNvContentPartPr/>
+              <p14:nvPr/>
+            </p14:nvContentPartPr>
+            <p14:xfrm>
+              <a:off x="6676465" y="3554137"/>
+              <a:ext cx="505800" cy="360"/>
+            </p14:xfrm>
+          </p:contentPart>
+        </mc:Choice>
+        <mc:Fallback>
+          <p:pic>
+            <p:nvPicPr>
+              <p:cNvPr id="8" name="Ink 7">
+                <a:extLst>
+                  <a:ext uri="{FF2B5EF4-FFF2-40B4-BE49-F238E27FC236}">
+                    <a16:creationId xmlns:a16="http://schemas.microsoft.com/office/drawing/2014/main" id="{68F3BDD3-BD31-4B8F-B614-F5C8217DD7CA}"/>
+                  </a:ext>
+                </a:extLst>
+              </p:cNvPr>
+              <p:cNvPicPr/>
+              <p:nvPr/>
+            </p:nvPicPr>
+            <p:blipFill>
+              <a:blip r:embed="rId5"/>
+              <a:stretch>
+                <a:fillRect/>
+              </a:stretch>
+            </p:blipFill>
+            <p:spPr>
+              <a:xfrm>
+                <a:off x="6622825" y="3446137"/>
+                <a:ext cx="613440" cy="216000"/>
+              </a:xfrm>
+              <a:prstGeom prst="rect">
+                <a:avLst/>
+              </a:prstGeom>
+            </p:spPr>
+          </p:pic>
+        </mc:Fallback>
+      </mc:AlternateContent>
+      <mc:AlternateContent xmlns:mc="http://schemas.openxmlformats.org/markup-compatibility/2006">
+        <mc:Choice xmlns:p14="http://schemas.microsoft.com/office/powerpoint/2010/main" Requires="p14">
+          <p:contentPart p14:bwMode="auto" r:id="rId6">
+            <p14:nvContentPartPr>
+              <p14:cNvPr id="9" name="Ink 8">
+                <a:extLst>
+                  <a:ext uri="{FF2B5EF4-FFF2-40B4-BE49-F238E27FC236}">
+                    <a16:creationId xmlns:a16="http://schemas.microsoft.com/office/drawing/2014/main" id="{A6B415CF-C97E-4817-9C7A-E50DF4C1E803}"/>
+                  </a:ext>
+                </a:extLst>
+              </p14:cNvPr>
+              <p14:cNvContentPartPr/>
+              <p14:nvPr/>
+            </p14:nvContentPartPr>
+            <p14:xfrm>
+              <a:off x="6849265" y="3527857"/>
+              <a:ext cx="360" cy="360"/>
+            </p14:xfrm>
+          </p:contentPart>
+        </mc:Choice>
+        <mc:Fallback>
+          <p:pic>
+            <p:nvPicPr>
+              <p:cNvPr id="9" name="Ink 8">
+                <a:extLst>
+                  <a:ext uri="{FF2B5EF4-FFF2-40B4-BE49-F238E27FC236}">
+                    <a16:creationId xmlns:a16="http://schemas.microsoft.com/office/drawing/2014/main" id="{A6B415CF-C97E-4817-9C7A-E50DF4C1E803}"/>
+                  </a:ext>
+                </a:extLst>
+              </p:cNvPr>
+              <p:cNvPicPr/>
+              <p:nvPr/>
+            </p:nvPicPr>
+            <p:blipFill>
+              <a:blip r:embed="rId3"/>
+              <a:stretch>
+                <a:fillRect/>
+              </a:stretch>
+            </p:blipFill>
+            <p:spPr>
+              <a:xfrm>
+                <a:off x="6795625" y="3420217"/>
+                <a:ext cx="108000" cy="216000"/>
+              </a:xfrm>
+              <a:prstGeom prst="rect">
+                <a:avLst/>
+              </a:prstGeom>
+            </p:spPr>
+          </p:pic>
+        </mc:Fallback>
+      </mc:AlternateContent>
+      <mc:AlternateContent xmlns:mc="http://schemas.openxmlformats.org/markup-compatibility/2006">
+        <mc:Choice xmlns:p14="http://schemas.microsoft.com/office/powerpoint/2010/main" Requires="p14">
+          <p:contentPart p14:bwMode="auto" r:id="rId7">
+            <p14:nvContentPartPr>
+              <p14:cNvPr id="10" name="Ink 9">
+                <a:extLst>
+                  <a:ext uri="{FF2B5EF4-FFF2-40B4-BE49-F238E27FC236}">
+                    <a16:creationId xmlns:a16="http://schemas.microsoft.com/office/drawing/2014/main" id="{8B093326-C0C5-4B0D-9009-B4E403182497}"/>
+                  </a:ext>
+                </a:extLst>
+              </p14:cNvPr>
+              <p14:cNvContentPartPr/>
+              <p14:nvPr/>
+            </p14:nvContentPartPr>
+            <p14:xfrm>
+              <a:off x="6892465" y="3527857"/>
+              <a:ext cx="360" cy="360"/>
+            </p14:xfrm>
+          </p:contentPart>
+        </mc:Choice>
+        <mc:Fallback>
+          <p:pic>
+            <p:nvPicPr>
+              <p:cNvPr id="10" name="Ink 9">
+                <a:extLst>
+                  <a:ext uri="{FF2B5EF4-FFF2-40B4-BE49-F238E27FC236}">
+                    <a16:creationId xmlns:a16="http://schemas.microsoft.com/office/drawing/2014/main" id="{8B093326-C0C5-4B0D-9009-B4E403182497}"/>
+                  </a:ext>
+                </a:extLst>
+              </p:cNvPr>
+              <p:cNvPicPr/>
+              <p:nvPr/>
+            </p:nvPicPr>
+            <p:blipFill>
+              <a:blip r:embed="rId3"/>
+              <a:stretch>
+                <a:fillRect/>
+              </a:stretch>
+            </p:blipFill>
+            <p:spPr>
+              <a:xfrm>
+                <a:off x="6838465" y="3420217"/>
+                <a:ext cx="108000" cy="216000"/>
+              </a:xfrm>
+              <a:prstGeom prst="rect">
+                <a:avLst/>
+              </a:prstGeom>
+            </p:spPr>
+          </p:pic>
+        </mc:Fallback>
+      </mc:AlternateContent>
+      <mc:AlternateContent xmlns:mc="http://schemas.openxmlformats.org/markup-compatibility/2006">
+        <mc:Choice xmlns:p14="http://schemas.microsoft.com/office/powerpoint/2010/main" Requires="p14">
+          <p:contentPart p14:bwMode="auto" r:id="rId8">
+            <p14:nvContentPartPr>
+              <p14:cNvPr id="11" name="Ink 10">
+                <a:extLst>
+                  <a:ext uri="{FF2B5EF4-FFF2-40B4-BE49-F238E27FC236}">
+                    <a16:creationId xmlns:a16="http://schemas.microsoft.com/office/drawing/2014/main" id="{0ABF57AA-BC30-473B-8640-F9C9FCD74297}"/>
+                  </a:ext>
+                </a:extLst>
+              </p14:cNvPr>
+              <p14:cNvContentPartPr/>
+              <p14:nvPr/>
+            </p14:nvContentPartPr>
+            <p14:xfrm>
+              <a:off x="6892465" y="3527857"/>
+              <a:ext cx="360" cy="360"/>
+            </p14:xfrm>
+          </p:contentPart>
+        </mc:Choice>
+        <mc:Fallback>
+          <p:pic>
+            <p:nvPicPr>
+              <p:cNvPr id="11" name="Ink 10">
+                <a:extLst>
+                  <a:ext uri="{FF2B5EF4-FFF2-40B4-BE49-F238E27FC236}">
+                    <a16:creationId xmlns:a16="http://schemas.microsoft.com/office/drawing/2014/main" id="{0ABF57AA-BC30-473B-8640-F9C9FCD74297}"/>
+                  </a:ext>
+                </a:extLst>
+              </p:cNvPr>
+              <p:cNvPicPr/>
+              <p:nvPr/>
+            </p:nvPicPr>
+            <p:blipFill>
+              <a:blip r:embed="rId3"/>
+              <a:stretch>
+                <a:fillRect/>
+              </a:stretch>
+            </p:blipFill>
+            <p:spPr>
+              <a:xfrm>
+                <a:off x="6838465" y="3420217"/>
+                <a:ext cx="108000" cy="216000"/>
+              </a:xfrm>
+              <a:prstGeom prst="rect">
+                <a:avLst/>
+              </a:prstGeom>
+            </p:spPr>
+          </p:pic>
+        </mc:Fallback>
+      </mc:AlternateContent>
+      <mc:AlternateContent xmlns:mc="http://schemas.openxmlformats.org/markup-compatibility/2006">
+        <mc:Choice xmlns:p14="http://schemas.microsoft.com/office/powerpoint/2010/main" Requires="p14">
+          <p:contentPart p14:bwMode="auto" r:id="rId9">
+            <p14:nvContentPartPr>
+              <p14:cNvPr id="12" name="Ink 11">
+                <a:extLst>
+                  <a:ext uri="{FF2B5EF4-FFF2-40B4-BE49-F238E27FC236}">
+                    <a16:creationId xmlns:a16="http://schemas.microsoft.com/office/drawing/2014/main" id="{D63A491D-220A-41ED-91D9-F3127AF5CDCF}"/>
+                  </a:ext>
+                </a:extLst>
+              </p14:cNvPr>
+              <p14:cNvContentPartPr/>
+              <p14:nvPr/>
+            </p14:nvContentPartPr>
+            <p14:xfrm>
+              <a:off x="6038545" y="3527857"/>
+              <a:ext cx="360" cy="360"/>
+            </p14:xfrm>
+          </p:contentPart>
+        </mc:Choice>
+        <mc:Fallback>
+          <p:pic>
+            <p:nvPicPr>
+              <p:cNvPr id="12" name="Ink 11">
+                <a:extLst>
+                  <a:ext uri="{FF2B5EF4-FFF2-40B4-BE49-F238E27FC236}">
+                    <a16:creationId xmlns:a16="http://schemas.microsoft.com/office/drawing/2014/main" id="{D63A491D-220A-41ED-91D9-F3127AF5CDCF}"/>
+                  </a:ext>
+                </a:extLst>
+              </p:cNvPr>
+              <p:cNvPicPr/>
+              <p:nvPr/>
+            </p:nvPicPr>
+            <p:blipFill>
+              <a:blip r:embed="rId3"/>
+              <a:stretch>
+                <a:fillRect/>
+              </a:stretch>
+            </p:blipFill>
+            <p:spPr>
+              <a:xfrm>
+                <a:off x="5984545" y="3420217"/>
+                <a:ext cx="108000" cy="216000"/>
+              </a:xfrm>
+              <a:prstGeom prst="rect">
+                <a:avLst/>
+              </a:prstGeom>
+            </p:spPr>
+          </p:pic>
+        </mc:Fallback>
+      </mc:AlternateContent>
+      <mc:AlternateContent xmlns:mc="http://schemas.openxmlformats.org/markup-compatibility/2006">
+        <mc:Choice xmlns:p14="http://schemas.microsoft.com/office/powerpoint/2010/main" Requires="p14">
+          <p:contentPart p14:bwMode="auto" r:id="rId10">
+            <p14:nvContentPartPr>
+              <p14:cNvPr id="13" name="Ink 12">
+                <a:extLst>
+                  <a:ext uri="{FF2B5EF4-FFF2-40B4-BE49-F238E27FC236}">
+                    <a16:creationId xmlns:a16="http://schemas.microsoft.com/office/drawing/2014/main" id="{1A87422F-2ADD-45AD-9758-5CB7ACAEB456}"/>
+                  </a:ext>
+                </a:extLst>
+              </p14:cNvPr>
+              <p14:cNvContentPartPr/>
+              <p14:nvPr/>
+            </p14:nvContentPartPr>
+            <p14:xfrm>
+              <a:off x="6762865" y="3502297"/>
+              <a:ext cx="568800" cy="18720"/>
+            </p14:xfrm>
+          </p:contentPart>
+        </mc:Choice>
+        <mc:Fallback>
+          <p:pic>
+            <p:nvPicPr>
+              <p:cNvPr id="13" name="Ink 12">
+                <a:extLst>
+                  <a:ext uri="{FF2B5EF4-FFF2-40B4-BE49-F238E27FC236}">
+                    <a16:creationId xmlns:a16="http://schemas.microsoft.com/office/drawing/2014/main" id="{1A87422F-2ADD-45AD-9758-5CB7ACAEB456}"/>
+                  </a:ext>
+                </a:extLst>
+              </p:cNvPr>
+              <p:cNvPicPr/>
+              <p:nvPr/>
+            </p:nvPicPr>
+            <p:blipFill>
+              <a:blip r:embed="rId11"/>
+              <a:stretch>
+                <a:fillRect/>
+              </a:stretch>
+            </p:blipFill>
+            <p:spPr>
+              <a:xfrm>
+                <a:off x="6709225" y="3394297"/>
+                <a:ext cx="676440" cy="234360"/>
+              </a:xfrm>
+              <a:prstGeom prst="rect">
+                <a:avLst/>
+              </a:prstGeom>
+            </p:spPr>
+          </p:pic>
+        </mc:Fallback>
+      </mc:AlternateContent>
     </p:spTree>
     <p:extLst>
       <p:ext uri="{BB962C8B-B14F-4D97-AF65-F5344CB8AC3E}">
@@ -23232,8 +24032,8 @@
         </p:blipFill>
         <p:spPr>
           <a:xfrm>
-            <a:off x="381001" y="1663720"/>
-            <a:ext cx="5358788" cy="4142169"/>
+            <a:off x="2199735" y="1397479"/>
+            <a:ext cx="7634377" cy="4606505"/>
           </a:xfrm>
         </p:spPr>
       </p:pic>
@@ -23323,36 +24123,6 @@
           </a:p>
         </p:txBody>
       </p:sp>
-      <p:pic>
-        <p:nvPicPr>
-          <p:cNvPr id="10" name="Picture 9">
-            <a:extLst>
-              <a:ext uri="{FF2B5EF4-FFF2-40B4-BE49-F238E27FC236}">
-                <a16:creationId xmlns:a16="http://schemas.microsoft.com/office/drawing/2014/main" id="{DCC4B78C-7D77-4364-A70C-4A77F1D17E20}"/>
-              </a:ext>
-            </a:extLst>
-          </p:cNvPr>
-          <p:cNvPicPr>
-            <a:picLocks noChangeAspect="1"/>
-          </p:cNvPicPr>
-          <p:nvPr/>
-        </p:nvPicPr>
-        <p:blipFill>
-          <a:blip r:embed="rId3"/>
-          <a:stretch>
-            <a:fillRect/>
-          </a:stretch>
-        </p:blipFill>
-        <p:spPr>
-          <a:xfrm>
-            <a:off x="5938092" y="1663720"/>
-            <a:ext cx="5772838" cy="4142169"/>
-          </a:xfrm>
-          <a:prstGeom prst="rect">
-            <a:avLst/>
-          </a:prstGeom>
-        </p:spPr>
-      </p:pic>
     </p:spTree>
     <p:extLst>
       <p:ext uri="{BB962C8B-B14F-4D97-AF65-F5344CB8AC3E}">

</xml_diff>